<commit_message>
Quantiles and box-and-whiskie plot are added.
</commit_message>
<xml_diff>
--- a/Exploratory_Analysis.pptx
+++ b/Exploratory_Analysis.pptx
@@ -5,7 +5,7 @@
     <p:sldMasterId id="2147483660" r:id="rId1"/>
   </p:sldMasterIdLst>
   <p:notesMasterIdLst>
-    <p:notesMasterId r:id="rId11"/>
+    <p:notesMasterId r:id="rId12"/>
   </p:notesMasterIdLst>
   <p:sldIdLst>
     <p:sldId id="257" r:id="rId2"/>
@@ -17,6 +17,7 @@
     <p:sldId id="262" r:id="rId8"/>
     <p:sldId id="263" r:id="rId9"/>
     <p:sldId id="264" r:id="rId10"/>
+    <p:sldId id="265" r:id="rId11"/>
   </p:sldIdLst>
   <p:sldSz cx="9144000" cy="6858000" type="screen4x3"/>
   <p:notesSz cx="6858000" cy="9144000"/>
@@ -231,7 +232,7 @@
           <a:p>
             <a:fld id="{CD863C69-6AC4-4515-84BB-C614EE551B82}" type="datetimeFigureOut">
               <a:rPr lang="ru-RU" smtClean="0"/>
-              <a:t>04.06.2019</a:t>
+              <a:t>05.06.2019</a:t>
             </a:fld>
             <a:endParaRPr lang="ru-RU"/>
           </a:p>
@@ -630,7 +631,7 @@
           <a:p>
             <a:fld id="{BF38C05E-219E-4729-9909-5B693F1E4DB2}" type="datetime1">
               <a:rPr lang="ru-RU" smtClean="0"/>
-              <a:t>04.06.2019</a:t>
+              <a:t>05.06.2019</a:t>
             </a:fld>
             <a:endParaRPr lang="ru-RU"/>
           </a:p>
@@ -800,7 +801,7 @@
           <a:p>
             <a:fld id="{E587BD1D-74D3-449F-A3CA-F47BBACDADC1}" type="datetime1">
               <a:rPr lang="ru-RU" smtClean="0"/>
-              <a:t>04.06.2019</a:t>
+              <a:t>05.06.2019</a:t>
             </a:fld>
             <a:endParaRPr lang="ru-RU"/>
           </a:p>
@@ -980,7 +981,7 @@
           <a:p>
             <a:fld id="{F156E365-3C59-403F-A598-8903968D44C1}" type="datetime1">
               <a:rPr lang="ru-RU" smtClean="0"/>
-              <a:t>04.06.2019</a:t>
+              <a:t>05.06.2019</a:t>
             </a:fld>
             <a:endParaRPr lang="ru-RU"/>
           </a:p>
@@ -1150,7 +1151,7 @@
           <a:p>
             <a:fld id="{D71D973D-7295-497C-A5AE-B81A0C1EA542}" type="datetime1">
               <a:rPr lang="ru-RU" smtClean="0"/>
-              <a:t>04.06.2019</a:t>
+              <a:t>05.06.2019</a:t>
             </a:fld>
             <a:endParaRPr lang="ru-RU"/>
           </a:p>
@@ -1394,7 +1395,7 @@
           <a:p>
             <a:fld id="{D43ACA65-1DF0-4542-9513-2573006F2B09}" type="datetime1">
               <a:rPr lang="ru-RU" smtClean="0"/>
-              <a:t>04.06.2019</a:t>
+              <a:t>05.06.2019</a:t>
             </a:fld>
             <a:endParaRPr lang="ru-RU"/>
           </a:p>
@@ -1626,7 +1627,7 @@
           <a:p>
             <a:fld id="{CE5D4F0D-BE92-42E2-AC19-D4AE919B8EEA}" type="datetime1">
               <a:rPr lang="ru-RU" smtClean="0"/>
-              <a:t>04.06.2019</a:t>
+              <a:t>05.06.2019</a:t>
             </a:fld>
             <a:endParaRPr lang="ru-RU"/>
           </a:p>
@@ -1993,7 +1994,7 @@
           <a:p>
             <a:fld id="{31712A4F-404C-4E2A-B048-29FEE1F56BCC}" type="datetime1">
               <a:rPr lang="ru-RU" smtClean="0"/>
-              <a:t>04.06.2019</a:t>
+              <a:t>05.06.2019</a:t>
             </a:fld>
             <a:endParaRPr lang="ru-RU"/>
           </a:p>
@@ -2111,7 +2112,7 @@
           <a:p>
             <a:fld id="{A591E32F-21C9-4A73-9D8C-CB8422C8AD99}" type="datetime1">
               <a:rPr lang="ru-RU" smtClean="0"/>
-              <a:t>04.06.2019</a:t>
+              <a:t>05.06.2019</a:t>
             </a:fld>
             <a:endParaRPr lang="ru-RU"/>
           </a:p>
@@ -2206,7 +2207,7 @@
           <a:p>
             <a:fld id="{E8BE7035-4758-4463-AF71-B436150BF40F}" type="datetime1">
               <a:rPr lang="ru-RU" smtClean="0"/>
-              <a:t>04.06.2019</a:t>
+              <a:t>05.06.2019</a:t>
             </a:fld>
             <a:endParaRPr lang="ru-RU"/>
           </a:p>
@@ -2483,7 +2484,7 @@
           <a:p>
             <a:fld id="{8BF22BB4-229E-48DC-A891-0BD3792CC568}" type="datetime1">
               <a:rPr lang="ru-RU" smtClean="0"/>
-              <a:t>04.06.2019</a:t>
+              <a:t>05.06.2019</a:t>
             </a:fld>
             <a:endParaRPr lang="ru-RU"/>
           </a:p>
@@ -2740,7 +2741,7 @@
           <a:p>
             <a:fld id="{B32F65DE-1A63-4DFF-816D-2C4DB2F0AABF}" type="datetime1">
               <a:rPr lang="ru-RU" smtClean="0"/>
-              <a:t>04.06.2019</a:t>
+              <a:t>05.06.2019</a:t>
             </a:fld>
             <a:endParaRPr lang="ru-RU"/>
           </a:p>
@@ -2953,7 +2954,7 @@
           <a:p>
             <a:fld id="{58F37F58-E97F-4EAB-9CA9-C9A7312871A5}" type="datetime1">
               <a:rPr lang="ru-RU" smtClean="0"/>
-              <a:t>04.06.2019</a:t>
+              <a:t>05.06.2019</a:t>
             </a:fld>
             <a:endParaRPr lang="ru-RU"/>
           </a:p>
@@ -3482,6 +3483,153 @@
 </p:sld>
 </file>
 
+<file path=ppt/slides/slide10.xml><?xml version="1.0" encoding="utf-8"?>
+<p:sld xmlns:a="http://schemas.openxmlformats.org/drawingml/2006/main" xmlns:r="http://schemas.openxmlformats.org/officeDocument/2006/relationships" xmlns:p="http://schemas.openxmlformats.org/presentationml/2006/main">
+  <p:cSld>
+    <p:spTree>
+      <p:nvGrpSpPr>
+        <p:cNvPr id="1" name=""/>
+        <p:cNvGrpSpPr/>
+        <p:nvPr/>
+      </p:nvGrpSpPr>
+      <p:grpSpPr>
+        <a:xfrm>
+          <a:off x="0" y="0"/>
+          <a:ext cx="0" cy="0"/>
+          <a:chOff x="0" y="0"/>
+          <a:chExt cx="0" cy="0"/>
+        </a:xfrm>
+      </p:grpSpPr>
+      <p:sp>
+        <p:nvSpPr>
+          <p:cNvPr id="4" name="Номер слайда 3"/>
+          <p:cNvSpPr>
+            <a:spLocks noGrp="1"/>
+          </p:cNvSpPr>
+          <p:nvPr>
+            <p:ph type="sldNum" sz="quarter" idx="12"/>
+          </p:nvPr>
+        </p:nvSpPr>
+        <p:spPr/>
+        <p:txBody>
+          <a:bodyPr/>
+          <a:lstStyle/>
+          <a:p>
+            <a:fld id="{C936BD1D-689F-4FB2-8C94-2D2423F07E62}" type="slidenum">
+              <a:rPr lang="ru-RU" smtClean="0"/>
+              <a:t>10</a:t>
+            </a:fld>
+            <a:endParaRPr lang="ru-RU"/>
+          </a:p>
+        </p:txBody>
+      </p:sp>
+      <p:sp>
+        <p:nvSpPr>
+          <p:cNvPr id="5" name="Заголовок 1"/>
+          <p:cNvSpPr>
+            <a:spLocks noGrp="1"/>
+          </p:cNvSpPr>
+          <p:nvPr>
+            <p:ph type="title"/>
+          </p:nvPr>
+        </p:nvSpPr>
+        <p:spPr>
+          <a:xfrm>
+            <a:off x="628650" y="365126"/>
+            <a:ext cx="7886700" cy="422525"/>
+          </a:xfrm>
+        </p:spPr>
+        <p:txBody>
+          <a:bodyPr vert="horz" lIns="91440" tIns="45720" rIns="91440" bIns="45720" rtlCol="0" anchor="b">
+            <a:noAutofit/>
+          </a:bodyPr>
+          <a:lstStyle/>
+          <a:p>
+            <a:pPr algn="ctr"/>
+            <a:r>
+              <a:rPr lang="en-US" sz="2400" b="1" dirty="0" smtClean="0">
+                <a:solidFill>
+                  <a:srgbClr val="00B0F0"/>
+                </a:solidFill>
+              </a:rPr>
+              <a:t>Box-and-whisky plot</a:t>
+            </a:r>
+            <a:endParaRPr lang="ru-RU" sz="2400" b="1" dirty="0">
+              <a:solidFill>
+                <a:srgbClr val="00B0F0"/>
+              </a:solidFill>
+            </a:endParaRPr>
+          </a:p>
+        </p:txBody>
+      </p:sp>
+      <p:pic>
+        <p:nvPicPr>
+          <p:cNvPr id="6" name="Рисунок 5"/>
+          <p:cNvPicPr>
+            <a:picLocks noChangeAspect="1"/>
+          </p:cNvPicPr>
+          <p:nvPr/>
+        </p:nvPicPr>
+        <p:blipFill>
+          <a:blip r:embed="rId2"/>
+          <a:stretch>
+            <a:fillRect/>
+          </a:stretch>
+        </p:blipFill>
+        <p:spPr>
+          <a:xfrm>
+            <a:off x="2720707" y="787651"/>
+            <a:ext cx="3286125" cy="3486150"/>
+          </a:xfrm>
+          <a:prstGeom prst="rect">
+            <a:avLst/>
+          </a:prstGeom>
+        </p:spPr>
+      </p:pic>
+      <p:sp>
+        <p:nvSpPr>
+          <p:cNvPr id="7" name="Прямоугольник 6"/>
+          <p:cNvSpPr/>
+          <p:nvPr/>
+        </p:nvSpPr>
+        <p:spPr>
+          <a:xfrm>
+            <a:off x="1923860" y="4326994"/>
+            <a:ext cx="5853065" cy="369332"/>
+          </a:xfrm>
+          <a:prstGeom prst="rect">
+            <a:avLst/>
+          </a:prstGeom>
+        </p:spPr>
+        <p:txBody>
+          <a:bodyPr wrap="square">
+            <a:spAutoFit/>
+          </a:bodyPr>
+          <a:lstStyle/>
+          <a:p>
+            <a:r>
+              <a:rPr lang="en-US" dirty="0">
+                <a:hlinkClick r:id="rId3"/>
+              </a:rPr>
+              <a:t>https://datavizcatalogue.com/methods/box_plot.html</a:t>
+            </a:r>
+            <a:endParaRPr lang="ru-RU" dirty="0"/>
+          </a:p>
+        </p:txBody>
+      </p:sp>
+    </p:spTree>
+    <p:extLst>
+      <p:ext uri="{BB962C8B-B14F-4D97-AF65-F5344CB8AC3E}">
+        <p14:creationId xmlns:p14="http://schemas.microsoft.com/office/powerpoint/2010/main" val="1071414632"/>
+      </p:ext>
+    </p:extLst>
+  </p:cSld>
+  <p:clrMapOvr>
+    <a:masterClrMapping/>
+  </p:clrMapOvr>
+</p:sld>
+</file>
+
 <file path=ppt/slides/slide2.xml><?xml version="1.0" encoding="utf-8"?>
 <p:sld xmlns:a="http://schemas.openxmlformats.org/drawingml/2006/main" xmlns:r="http://schemas.openxmlformats.org/officeDocument/2006/relationships" xmlns:p="http://schemas.openxmlformats.org/presentationml/2006/main">
   <p:cSld>
@@ -5045,19 +5193,7 @@
             </a:r>
             <a:r>
               <a:rPr lang="en-US" dirty="0" smtClean="0"/>
-              <a:t> </a:t>
-            </a:r>
-            <a:r>
-              <a:rPr lang="en-US" dirty="0" smtClean="0"/>
-              <a:t>initial</a:t>
-            </a:r>
-            <a:r>
-              <a:rPr lang="en-US" dirty="0" smtClean="0"/>
-              <a:t> </a:t>
-            </a:r>
-            <a:r>
-              <a:rPr lang="en-US" dirty="0" smtClean="0"/>
-              <a:t>homogeneity of the data set -&gt; AMT_ANNUITY and AMT_GOODS_PRICE are the most homogenous.</a:t>
+              <a:t> initial homogeneity of the data set -&gt; AMT_ANNUITY and AMT_GOODS_PRICE are the most homogenous.</a:t>
             </a:r>
           </a:p>
           <a:p>
@@ -5082,15 +5218,7 @@
             </a:r>
             <a:r>
               <a:rPr lang="en-US" dirty="0" smtClean="0"/>
-              <a:t>  preprocessing steps have to be taken to compile the </a:t>
-            </a:r>
-            <a:r>
-              <a:rPr lang="en-US" dirty="0" smtClean="0"/>
-              <a:t>homogeneous </a:t>
-            </a:r>
-            <a:r>
-              <a:rPr lang="en-US" dirty="0" smtClean="0"/>
-              <a:t>data set.</a:t>
+              <a:t>  preprocessing steps have to be taken to compile the homogeneous data set.</a:t>
             </a:r>
           </a:p>
           <a:p>
@@ -5381,25 +5509,6 @@
       </p:grpSpPr>
       <p:sp>
         <p:nvSpPr>
-          <p:cNvPr id="2" name="Заголовок 1"/>
-          <p:cNvSpPr>
-            <a:spLocks noGrp="1"/>
-          </p:cNvSpPr>
-          <p:nvPr>
-            <p:ph type="title"/>
-          </p:nvPr>
-        </p:nvSpPr>
-        <p:spPr/>
-        <p:txBody>
-          <a:bodyPr/>
-          <a:lstStyle/>
-          <a:p>
-            <a:endParaRPr lang="ru-RU" dirty="0"/>
-          </a:p>
-        </p:txBody>
-      </p:sp>
-      <p:sp>
-        <p:nvSpPr>
           <p:cNvPr id="4" name="Номер слайда 3"/>
           <p:cNvSpPr>
             <a:spLocks noGrp="1"/>
@@ -5418,6 +5527,159 @@
               <a:t>9</a:t>
             </a:fld>
             <a:endParaRPr lang="ru-RU"/>
+          </a:p>
+        </p:txBody>
+      </p:sp>
+      <p:pic>
+        <p:nvPicPr>
+          <p:cNvPr id="10" name="Рисунок 9"/>
+          <p:cNvPicPr>
+            <a:picLocks noChangeAspect="1"/>
+          </p:cNvPicPr>
+          <p:nvPr/>
+        </p:nvPicPr>
+        <p:blipFill>
+          <a:blip r:embed="rId3"/>
+          <a:stretch>
+            <a:fillRect/>
+          </a:stretch>
+        </p:blipFill>
+        <p:spPr>
+          <a:xfrm>
+            <a:off x="421049" y="1224104"/>
+            <a:ext cx="3069000" cy="4041000"/>
+          </a:xfrm>
+          <a:prstGeom prst="rect">
+            <a:avLst/>
+          </a:prstGeom>
+        </p:spPr>
+      </p:pic>
+      <p:sp>
+        <p:nvSpPr>
+          <p:cNvPr id="11" name="Заголовок 1"/>
+          <p:cNvSpPr>
+            <a:spLocks noGrp="1"/>
+          </p:cNvSpPr>
+          <p:nvPr>
+            <p:ph type="title"/>
+          </p:nvPr>
+        </p:nvSpPr>
+        <p:spPr>
+          <a:xfrm>
+            <a:off x="628650" y="365126"/>
+            <a:ext cx="7886700" cy="422525"/>
+          </a:xfrm>
+        </p:spPr>
+        <p:txBody>
+          <a:bodyPr vert="horz" lIns="91440" tIns="45720" rIns="91440" bIns="45720" rtlCol="0" anchor="b">
+            <a:noAutofit/>
+          </a:bodyPr>
+          <a:lstStyle/>
+          <a:p>
+            <a:pPr algn="ctr"/>
+            <a:r>
+              <a:rPr lang="en-US" sz="2400" b="1" dirty="0" smtClean="0">
+                <a:solidFill>
+                  <a:srgbClr val="00B0F0"/>
+                </a:solidFill>
+              </a:rPr>
+              <a:t>Quantiles</a:t>
+            </a:r>
+            <a:endParaRPr lang="ru-RU" sz="2400" b="1" dirty="0">
+              <a:solidFill>
+                <a:srgbClr val="00B0F0"/>
+              </a:solidFill>
+            </a:endParaRPr>
+          </a:p>
+        </p:txBody>
+      </p:sp>
+      <p:pic>
+        <p:nvPicPr>
+          <p:cNvPr id="12" name="Рисунок 11"/>
+          <p:cNvPicPr>
+            <a:picLocks noChangeAspect="1"/>
+          </p:cNvPicPr>
+          <p:nvPr/>
+        </p:nvPicPr>
+        <p:blipFill>
+          <a:blip r:embed="rId4"/>
+          <a:stretch>
+            <a:fillRect/>
+          </a:stretch>
+        </p:blipFill>
+        <p:spPr>
+          <a:xfrm>
+            <a:off x="3673444" y="1224104"/>
+            <a:ext cx="5298542" cy="3060426"/>
+          </a:xfrm>
+          <a:prstGeom prst="rect">
+            <a:avLst/>
+          </a:prstGeom>
+        </p:spPr>
+      </p:pic>
+      <p:sp>
+        <p:nvSpPr>
+          <p:cNvPr id="13" name="TextBox 12"/>
+          <p:cNvSpPr txBox="1"/>
+          <p:nvPr/>
+        </p:nvSpPr>
+        <p:spPr>
+          <a:xfrm>
+            <a:off x="421049" y="869133"/>
+            <a:ext cx="3069000" cy="369332"/>
+          </a:xfrm>
+          <a:prstGeom prst="rect">
+            <a:avLst/>
+          </a:prstGeom>
+          <a:noFill/>
+        </p:spPr>
+        <p:txBody>
+          <a:bodyPr wrap="square" rtlCol="0">
+            <a:spAutoFit/>
+          </a:bodyPr>
+          <a:lstStyle/>
+          <a:p>
+            <a:r>
+              <a:rPr lang="en-US" dirty="0" smtClean="0">
+                <a:solidFill>
+                  <a:srgbClr val="92D050"/>
+                </a:solidFill>
+              </a:rPr>
+              <a:t>Statistics</a:t>
+            </a:r>
+          </a:p>
+        </p:txBody>
+      </p:sp>
+      <p:sp>
+        <p:nvSpPr>
+          <p:cNvPr id="14" name="TextBox 13"/>
+          <p:cNvSpPr txBox="1"/>
+          <p:nvPr/>
+        </p:nvSpPr>
+        <p:spPr>
+          <a:xfrm>
+            <a:off x="3672973" y="821211"/>
+            <a:ext cx="3069000" cy="369332"/>
+          </a:xfrm>
+          <a:prstGeom prst="rect">
+            <a:avLst/>
+          </a:prstGeom>
+          <a:noFill/>
+        </p:spPr>
+        <p:txBody>
+          <a:bodyPr wrap="square" rtlCol="0">
+            <a:spAutoFit/>
+          </a:bodyPr>
+          <a:lstStyle/>
+          <a:p>
+            <a:r>
+              <a:rPr lang="en-US" dirty="0" smtClean="0">
+                <a:solidFill>
+                  <a:srgbClr val="92D050"/>
+                </a:solidFill>
+              </a:rPr>
+              <a:t>Probability Distribution</a:t>
+            </a:r>
           </a:p>
         </p:txBody>
       </p:sp>

</xml_diff>

<commit_message>
Grouping and variance are added.
</commit_message>
<xml_diff>
--- a/Exploratory_Analysis.pptx
+++ b/Exploratory_Analysis.pptx
@@ -5,7 +5,7 @@
     <p:sldMasterId id="2147483660" r:id="rId1"/>
   </p:sldMasterIdLst>
   <p:notesMasterIdLst>
-    <p:notesMasterId r:id="rId12"/>
+    <p:notesMasterId r:id="rId15"/>
   </p:notesMasterIdLst>
   <p:sldIdLst>
     <p:sldId id="257" r:id="rId2"/>
@@ -18,6 +18,9 @@
     <p:sldId id="263" r:id="rId9"/>
     <p:sldId id="264" r:id="rId10"/>
     <p:sldId id="265" r:id="rId11"/>
+    <p:sldId id="266" r:id="rId12"/>
+    <p:sldId id="267" r:id="rId13"/>
+    <p:sldId id="268" r:id="rId14"/>
   </p:sldIdLst>
   <p:sldSz cx="9144000" cy="6858000" type="screen4x3"/>
   <p:notesSz cx="6858000" cy="9144000"/>
@@ -3630,6 +3633,731 @@
 </p:sld>
 </file>
 
+<file path=ppt/slides/slide11.xml><?xml version="1.0" encoding="utf-8"?>
+<p:sld xmlns:a="http://schemas.openxmlformats.org/drawingml/2006/main" xmlns:r="http://schemas.openxmlformats.org/officeDocument/2006/relationships" xmlns:p="http://schemas.openxmlformats.org/presentationml/2006/main">
+  <p:cSld>
+    <p:spTree>
+      <p:nvGrpSpPr>
+        <p:cNvPr id="1" name=""/>
+        <p:cNvGrpSpPr/>
+        <p:nvPr/>
+      </p:nvGrpSpPr>
+      <p:grpSpPr>
+        <a:xfrm>
+          <a:off x="0" y="0"/>
+          <a:ext cx="0" cy="0"/>
+          <a:chOff x="0" y="0"/>
+          <a:chExt cx="0" cy="0"/>
+        </a:xfrm>
+      </p:grpSpPr>
+      <p:sp>
+        <p:nvSpPr>
+          <p:cNvPr id="4" name="Номер слайда 3"/>
+          <p:cNvSpPr>
+            <a:spLocks noGrp="1"/>
+          </p:cNvSpPr>
+          <p:nvPr>
+            <p:ph type="sldNum" sz="quarter" idx="12"/>
+          </p:nvPr>
+        </p:nvSpPr>
+        <p:spPr/>
+        <p:txBody>
+          <a:bodyPr/>
+          <a:lstStyle/>
+          <a:p>
+            <a:fld id="{C936BD1D-689F-4FB2-8C94-2D2423F07E62}" type="slidenum">
+              <a:rPr lang="ru-RU" smtClean="0"/>
+              <a:t>11</a:t>
+            </a:fld>
+            <a:endParaRPr lang="ru-RU"/>
+          </a:p>
+        </p:txBody>
+      </p:sp>
+      <p:sp>
+        <p:nvSpPr>
+          <p:cNvPr id="5" name="Заголовок 1"/>
+          <p:cNvSpPr>
+            <a:spLocks noGrp="1"/>
+          </p:cNvSpPr>
+          <p:nvPr>
+            <p:ph type="title"/>
+          </p:nvPr>
+        </p:nvSpPr>
+        <p:spPr>
+          <a:xfrm>
+            <a:off x="628650" y="365126"/>
+            <a:ext cx="7886700" cy="422525"/>
+          </a:xfrm>
+        </p:spPr>
+        <p:txBody>
+          <a:bodyPr vert="horz" lIns="91440" tIns="45720" rIns="91440" bIns="45720" rtlCol="0" anchor="b">
+            <a:noAutofit/>
+          </a:bodyPr>
+          <a:lstStyle/>
+          <a:p>
+            <a:pPr algn="ctr"/>
+            <a:r>
+              <a:rPr lang="en-US" sz="2400" b="1" dirty="0">
+                <a:solidFill>
+                  <a:srgbClr val="00B0F0"/>
+                </a:solidFill>
+              </a:rPr>
+              <a:t>Impact of Grouping Towards Mean and Variance</a:t>
+            </a:r>
+            <a:endParaRPr lang="ru-RU" sz="2400" b="1" dirty="0">
+              <a:solidFill>
+                <a:srgbClr val="00B0F0"/>
+              </a:solidFill>
+            </a:endParaRPr>
+          </a:p>
+        </p:txBody>
+      </p:sp>
+      <p:pic>
+        <p:nvPicPr>
+          <p:cNvPr id="6" name="Рисунок 5"/>
+          <p:cNvPicPr>
+            <a:picLocks noChangeAspect="1"/>
+          </p:cNvPicPr>
+          <p:nvPr/>
+        </p:nvPicPr>
+        <p:blipFill>
+          <a:blip r:embed="rId2"/>
+          <a:stretch>
+            <a:fillRect/>
+          </a:stretch>
+        </p:blipFill>
+        <p:spPr>
+          <a:xfrm>
+            <a:off x="1975500" y="1122870"/>
+            <a:ext cx="5193000" cy="2367000"/>
+          </a:xfrm>
+          <a:prstGeom prst="rect">
+            <a:avLst/>
+          </a:prstGeom>
+        </p:spPr>
+      </p:pic>
+      <p:sp>
+        <p:nvSpPr>
+          <p:cNvPr id="7" name="TextBox 6"/>
+          <p:cNvSpPr txBox="1"/>
+          <p:nvPr/>
+        </p:nvSpPr>
+        <p:spPr>
+          <a:xfrm>
+            <a:off x="506994" y="3802455"/>
+            <a:ext cx="8130012" cy="1754326"/>
+          </a:xfrm>
+          <a:prstGeom prst="rect">
+            <a:avLst/>
+          </a:prstGeom>
+          <a:noFill/>
+        </p:spPr>
+        <p:txBody>
+          <a:bodyPr wrap="square" rtlCol="0">
+            <a:spAutoFit/>
+          </a:bodyPr>
+          <a:lstStyle/>
+          <a:p>
+            <a:pPr algn="just"/>
+            <a:r>
+              <a:rPr lang="en-US" dirty="0" smtClean="0"/>
+              <a:t>It </a:t>
+            </a:r>
+            <a:r>
+              <a:rPr lang="en-US" b="1" dirty="0" smtClean="0"/>
+              <a:t>is strongly </a:t>
+            </a:r>
+            <a:r>
+              <a:rPr lang="en-US" dirty="0" smtClean="0"/>
+              <a:t>recommended to investigate subgrouping in the entire data set.</a:t>
+            </a:r>
+          </a:p>
+          <a:p>
+            <a:pPr algn="just"/>
+            <a:endParaRPr lang="en-US" dirty="0"/>
+          </a:p>
+          <a:p>
+            <a:pPr algn="just"/>
+            <a:r>
+              <a:rPr lang="en-US" dirty="0" smtClean="0"/>
+              <a:t>The example above proves the variable “AMT_CREDIT_USD” could comprise two different sub samples because of </a:t>
+            </a:r>
+            <a:r>
+              <a:rPr lang="en-US" b="1" dirty="0" smtClean="0"/>
+              <a:t>material </a:t>
+            </a:r>
+            <a:r>
+              <a:rPr lang="en-US" dirty="0" smtClean="0"/>
+              <a:t>difference of Mean.</a:t>
+            </a:r>
+          </a:p>
+          <a:p>
+            <a:pPr algn="just"/>
+            <a:endParaRPr lang="en-US" dirty="0"/>
+          </a:p>
+          <a:p>
+            <a:pPr algn="just"/>
+            <a:r>
+              <a:rPr lang="en-US" dirty="0" smtClean="0"/>
+              <a:t>The same approach is recommended to use about Variance analysis for subgroups.</a:t>
+            </a:r>
+            <a:endParaRPr lang="ru-RU" dirty="0"/>
+          </a:p>
+        </p:txBody>
+      </p:sp>
+    </p:spTree>
+    <p:extLst>
+      <p:ext uri="{BB962C8B-B14F-4D97-AF65-F5344CB8AC3E}">
+        <p14:creationId xmlns:p14="http://schemas.microsoft.com/office/powerpoint/2010/main" val="787667936"/>
+      </p:ext>
+    </p:extLst>
+  </p:cSld>
+  <p:clrMapOvr>
+    <a:masterClrMapping/>
+  </p:clrMapOvr>
+</p:sld>
+</file>
+
+<file path=ppt/slides/slide12.xml><?xml version="1.0" encoding="utf-8"?>
+<p:sld xmlns:a="http://schemas.openxmlformats.org/drawingml/2006/main" xmlns:r="http://schemas.openxmlformats.org/officeDocument/2006/relationships" xmlns:p="http://schemas.openxmlformats.org/presentationml/2006/main">
+  <p:cSld>
+    <p:spTree>
+      <p:nvGrpSpPr>
+        <p:cNvPr id="1" name=""/>
+        <p:cNvGrpSpPr/>
+        <p:nvPr/>
+      </p:nvGrpSpPr>
+      <p:grpSpPr>
+        <a:xfrm>
+          <a:off x="0" y="0"/>
+          <a:ext cx="0" cy="0"/>
+          <a:chOff x="0" y="0"/>
+          <a:chExt cx="0" cy="0"/>
+        </a:xfrm>
+      </p:grpSpPr>
+      <p:sp>
+        <p:nvSpPr>
+          <p:cNvPr id="2" name="Заголовок 1"/>
+          <p:cNvSpPr>
+            <a:spLocks noGrp="1"/>
+          </p:cNvSpPr>
+          <p:nvPr>
+            <p:ph type="title"/>
+          </p:nvPr>
+        </p:nvSpPr>
+        <p:spPr>
+          <a:xfrm>
+            <a:off x="628650" y="365127"/>
+            <a:ext cx="7886700" cy="476846"/>
+          </a:xfrm>
+        </p:spPr>
+        <p:txBody>
+          <a:bodyPr vert="horz" lIns="91440" tIns="45720" rIns="91440" bIns="45720" rtlCol="0" anchor="b">
+            <a:noAutofit/>
+          </a:bodyPr>
+          <a:lstStyle/>
+          <a:p>
+            <a:pPr algn="ctr"/>
+            <a:r>
+              <a:rPr lang="en-US" sz="2400" b="1" dirty="0">
+                <a:solidFill>
+                  <a:srgbClr val="00B0F0"/>
+                </a:solidFill>
+              </a:rPr>
+              <a:t>Variance (Measures of deviation)</a:t>
+            </a:r>
+            <a:endParaRPr lang="ru-RU" sz="2400" b="1" dirty="0">
+              <a:solidFill>
+                <a:srgbClr val="00B0F0"/>
+              </a:solidFill>
+            </a:endParaRPr>
+          </a:p>
+        </p:txBody>
+      </p:sp>
+      <p:sp>
+        <p:nvSpPr>
+          <p:cNvPr id="4" name="Номер слайда 3"/>
+          <p:cNvSpPr>
+            <a:spLocks noGrp="1"/>
+          </p:cNvSpPr>
+          <p:nvPr>
+            <p:ph type="sldNum" sz="quarter" idx="12"/>
+          </p:nvPr>
+        </p:nvSpPr>
+        <p:spPr/>
+        <p:txBody>
+          <a:bodyPr/>
+          <a:lstStyle/>
+          <a:p>
+            <a:fld id="{C936BD1D-689F-4FB2-8C94-2D2423F07E62}" type="slidenum">
+              <a:rPr lang="ru-RU" smtClean="0"/>
+              <a:t>12</a:t>
+            </a:fld>
+            <a:endParaRPr lang="ru-RU"/>
+          </a:p>
+        </p:txBody>
+      </p:sp>
+      <p:sp>
+        <p:nvSpPr>
+          <p:cNvPr id="7" name="Прямоугольник 6"/>
+          <p:cNvSpPr/>
+          <p:nvPr/>
+        </p:nvSpPr>
+        <p:spPr>
+          <a:xfrm>
+            <a:off x="3074012" y="2737369"/>
+            <a:ext cx="5690103" cy="369332"/>
+          </a:xfrm>
+          <a:prstGeom prst="rect">
+            <a:avLst/>
+          </a:prstGeom>
+        </p:spPr>
+        <p:txBody>
+          <a:bodyPr wrap="square">
+            <a:spAutoFit/>
+          </a:bodyPr>
+          <a:lstStyle/>
+          <a:p>
+            <a:r>
+              <a:rPr lang="en-US" dirty="0">
+                <a:hlinkClick r:id="rId2"/>
+              </a:rPr>
+              <a:t>https://en.wikipedia.org/wiki/Average_absolute_deviation</a:t>
+            </a:r>
+            <a:endParaRPr lang="ru-RU" dirty="0"/>
+          </a:p>
+        </p:txBody>
+      </p:sp>
+      <p:pic>
+        <p:nvPicPr>
+          <p:cNvPr id="8" name="Рисунок 7"/>
+          <p:cNvPicPr>
+            <a:picLocks noChangeAspect="1"/>
+          </p:cNvPicPr>
+          <p:nvPr/>
+        </p:nvPicPr>
+        <p:blipFill>
+          <a:blip r:embed="rId3"/>
+          <a:stretch>
+            <a:fillRect/>
+          </a:stretch>
+        </p:blipFill>
+        <p:spPr>
+          <a:xfrm>
+            <a:off x="968428" y="2598907"/>
+            <a:ext cx="1890085" cy="657421"/>
+          </a:xfrm>
+          <a:prstGeom prst="rect">
+            <a:avLst/>
+          </a:prstGeom>
+        </p:spPr>
+      </p:pic>
+      <p:sp>
+        <p:nvSpPr>
+          <p:cNvPr id="10" name="Прямоугольник 9"/>
+          <p:cNvSpPr/>
+          <p:nvPr/>
+        </p:nvSpPr>
+        <p:spPr>
+          <a:xfrm>
+            <a:off x="374760" y="1135165"/>
+            <a:ext cx="5075426" cy="369332"/>
+          </a:xfrm>
+          <a:prstGeom prst="rect">
+            <a:avLst/>
+          </a:prstGeom>
+        </p:spPr>
+        <p:txBody>
+          <a:bodyPr wrap="square">
+            <a:spAutoFit/>
+          </a:bodyPr>
+          <a:lstStyle/>
+          <a:p>
+            <a:r>
+              <a:rPr lang="en-US" dirty="0" smtClean="0">
+                <a:latin typeface="Minion Pro"/>
+              </a:rPr>
+              <a:t>Range (R) </a:t>
+            </a:r>
+            <a:r>
+              <a:rPr lang="en-US" dirty="0">
+                <a:latin typeface="Minion Pro"/>
+              </a:rPr>
+              <a:t>= Maximum value – Minimum value</a:t>
+            </a:r>
+            <a:endParaRPr lang="ru-RU" dirty="0"/>
+          </a:p>
+        </p:txBody>
+      </p:sp>
+      <p:sp>
+        <p:nvSpPr>
+          <p:cNvPr id="11" name="Прямоугольник 10"/>
+          <p:cNvSpPr/>
+          <p:nvPr/>
+        </p:nvSpPr>
+        <p:spPr>
+          <a:xfrm>
+            <a:off x="374760" y="1437427"/>
+            <a:ext cx="7496269" cy="369332"/>
+          </a:xfrm>
+          <a:prstGeom prst="rect">
+            <a:avLst/>
+          </a:prstGeom>
+        </p:spPr>
+        <p:txBody>
+          <a:bodyPr wrap="square">
+            <a:spAutoFit/>
+          </a:bodyPr>
+          <a:lstStyle/>
+          <a:p>
+            <a:r>
+              <a:rPr lang="en-US" dirty="0">
+                <a:hlinkClick r:id="rId4"/>
+              </a:rPr>
+              <a:t>https://www.toppr.com/guides/maths/statistics/range-and-mean-deviation/</a:t>
+            </a:r>
+            <a:endParaRPr lang="ru-RU" dirty="0"/>
+          </a:p>
+        </p:txBody>
+      </p:sp>
+      <p:sp>
+        <p:nvSpPr>
+          <p:cNvPr id="13" name="Прямоугольник 12"/>
+          <p:cNvSpPr/>
+          <p:nvPr/>
+        </p:nvSpPr>
+        <p:spPr>
+          <a:xfrm>
+            <a:off x="389281" y="2737369"/>
+            <a:ext cx="622630" cy="369332"/>
+          </a:xfrm>
+          <a:prstGeom prst="rect">
+            <a:avLst/>
+          </a:prstGeom>
+        </p:spPr>
+        <p:txBody>
+          <a:bodyPr wrap="square">
+            <a:spAutoFit/>
+          </a:bodyPr>
+          <a:lstStyle/>
+          <a:p>
+            <a:r>
+              <a:rPr lang="en-US" dirty="0">
+                <a:latin typeface="Minion Pro"/>
+              </a:rPr>
+              <a:t>d</a:t>
+            </a:r>
+            <a:r>
+              <a:rPr lang="en-US" dirty="0" smtClean="0">
+                <a:latin typeface="Minion Pro"/>
+              </a:rPr>
+              <a:t> = </a:t>
+            </a:r>
+            <a:endParaRPr lang="ru-RU" dirty="0"/>
+          </a:p>
+        </p:txBody>
+      </p:sp>
+      <p:sp>
+        <p:nvSpPr>
+          <p:cNvPr id="14" name="TextBox 13"/>
+          <p:cNvSpPr txBox="1"/>
+          <p:nvPr/>
+        </p:nvSpPr>
+        <p:spPr>
+          <a:xfrm>
+            <a:off x="293640" y="2250441"/>
+            <a:ext cx="3956364" cy="369332"/>
+          </a:xfrm>
+          <a:prstGeom prst="rect">
+            <a:avLst/>
+          </a:prstGeom>
+          <a:noFill/>
+        </p:spPr>
+        <p:txBody>
+          <a:bodyPr wrap="square" rtlCol="0">
+            <a:spAutoFit/>
+          </a:bodyPr>
+          <a:lstStyle/>
+          <a:p>
+            <a:r>
+              <a:rPr lang="en-US" b="1" dirty="0"/>
+              <a:t>Average absolute </a:t>
+            </a:r>
+            <a:r>
+              <a:rPr lang="en-US" b="1" dirty="0" smtClean="0"/>
+              <a:t>deviation (d)</a:t>
+            </a:r>
+            <a:endParaRPr lang="en-US" b="1" dirty="0"/>
+          </a:p>
+        </p:txBody>
+      </p:sp>
+      <p:sp>
+        <p:nvSpPr>
+          <p:cNvPr id="15" name="TextBox 14"/>
+          <p:cNvSpPr txBox="1"/>
+          <p:nvPr/>
+        </p:nvSpPr>
+        <p:spPr>
+          <a:xfrm>
+            <a:off x="374759" y="795362"/>
+            <a:ext cx="1100955" cy="369332"/>
+          </a:xfrm>
+          <a:prstGeom prst="rect">
+            <a:avLst/>
+          </a:prstGeom>
+          <a:noFill/>
+        </p:spPr>
+        <p:txBody>
+          <a:bodyPr wrap="square" rtlCol="0">
+            <a:spAutoFit/>
+          </a:bodyPr>
+          <a:lstStyle/>
+          <a:p>
+            <a:r>
+              <a:rPr lang="en-US" b="1" dirty="0" smtClean="0"/>
+              <a:t>Range (R)</a:t>
+            </a:r>
+            <a:endParaRPr lang="ru-RU" b="1" dirty="0"/>
+          </a:p>
+        </p:txBody>
+      </p:sp>
+      <p:pic>
+        <p:nvPicPr>
+          <p:cNvPr id="19" name="Рисунок 18"/>
+          <p:cNvPicPr>
+            <a:picLocks noChangeAspect="1"/>
+          </p:cNvPicPr>
+          <p:nvPr/>
+        </p:nvPicPr>
+        <p:blipFill>
+          <a:blip r:embed="rId5"/>
+          <a:stretch>
+            <a:fillRect/>
+          </a:stretch>
+        </p:blipFill>
+        <p:spPr>
+          <a:xfrm>
+            <a:off x="293640" y="4027021"/>
+            <a:ext cx="3276600" cy="590550"/>
+          </a:xfrm>
+          <a:prstGeom prst="rect">
+            <a:avLst/>
+          </a:prstGeom>
+        </p:spPr>
+      </p:pic>
+      <p:sp>
+        <p:nvSpPr>
+          <p:cNvPr id="20" name="TextBox 19"/>
+          <p:cNvSpPr txBox="1"/>
+          <p:nvPr/>
+        </p:nvSpPr>
+        <p:spPr>
+          <a:xfrm>
+            <a:off x="293640" y="3644565"/>
+            <a:ext cx="3956364" cy="369332"/>
+          </a:xfrm>
+          <a:prstGeom prst="rect">
+            <a:avLst/>
+          </a:prstGeom>
+          <a:noFill/>
+        </p:spPr>
+        <p:txBody>
+          <a:bodyPr wrap="square" rtlCol="0">
+            <a:spAutoFit/>
+          </a:bodyPr>
+          <a:lstStyle/>
+          <a:p>
+            <a:r>
+              <a:rPr lang="en-US" b="1" dirty="0" smtClean="0"/>
+              <a:t>Standard deviation (</a:t>
+            </a:r>
+            <a:r>
+              <a:rPr lang="el-GR" b="1" dirty="0" smtClean="0"/>
+              <a:t>σ</a:t>
+            </a:r>
+            <a:r>
+              <a:rPr lang="en-US" b="1" dirty="0" smtClean="0"/>
+              <a:t>)</a:t>
+            </a:r>
+            <a:endParaRPr lang="en-US" b="1" dirty="0"/>
+          </a:p>
+        </p:txBody>
+      </p:sp>
+      <p:sp>
+        <p:nvSpPr>
+          <p:cNvPr id="21" name="Прямоугольник 20"/>
+          <p:cNvSpPr/>
+          <p:nvPr/>
+        </p:nvSpPr>
+        <p:spPr>
+          <a:xfrm>
+            <a:off x="3570240" y="4063573"/>
+            <a:ext cx="4945110" cy="369332"/>
+          </a:xfrm>
+          <a:prstGeom prst="rect">
+            <a:avLst/>
+          </a:prstGeom>
+        </p:spPr>
+        <p:txBody>
+          <a:bodyPr wrap="square">
+            <a:spAutoFit/>
+          </a:bodyPr>
+          <a:lstStyle/>
+          <a:p>
+            <a:r>
+              <a:rPr lang="en-US" dirty="0">
+                <a:hlinkClick r:id="rId6"/>
+              </a:rPr>
+              <a:t>https://en.wikipedia.org/wiki/Standard_deviation</a:t>
+            </a:r>
+            <a:endParaRPr lang="ru-RU" dirty="0"/>
+          </a:p>
+        </p:txBody>
+      </p:sp>
+    </p:spTree>
+    <p:extLst>
+      <p:ext uri="{BB962C8B-B14F-4D97-AF65-F5344CB8AC3E}">
+        <p14:creationId xmlns:p14="http://schemas.microsoft.com/office/powerpoint/2010/main" val="2562255982"/>
+      </p:ext>
+    </p:extLst>
+  </p:cSld>
+  <p:clrMapOvr>
+    <a:masterClrMapping/>
+  </p:clrMapOvr>
+  <p:timing>
+    <p:tnLst>
+      <p:par>
+        <p:cTn id="1" dur="indefinite" restart="never" nodeType="tmRoot"/>
+      </p:par>
+    </p:tnLst>
+  </p:timing>
+</p:sld>
+</file>
+
+<file path=ppt/slides/slide13.xml><?xml version="1.0" encoding="utf-8"?>
+<p:sld xmlns:a="http://schemas.openxmlformats.org/drawingml/2006/main" xmlns:r="http://schemas.openxmlformats.org/officeDocument/2006/relationships" xmlns:p="http://schemas.openxmlformats.org/presentationml/2006/main">
+  <p:cSld>
+    <p:spTree>
+      <p:nvGrpSpPr>
+        <p:cNvPr id="1" name=""/>
+        <p:cNvGrpSpPr/>
+        <p:nvPr/>
+      </p:nvGrpSpPr>
+      <p:grpSpPr>
+        <a:xfrm>
+          <a:off x="0" y="0"/>
+          <a:ext cx="0" cy="0"/>
+          <a:chOff x="0" y="0"/>
+          <a:chExt cx="0" cy="0"/>
+        </a:xfrm>
+      </p:grpSpPr>
+      <p:sp>
+        <p:nvSpPr>
+          <p:cNvPr id="4" name="Номер слайда 3"/>
+          <p:cNvSpPr>
+            <a:spLocks noGrp="1"/>
+          </p:cNvSpPr>
+          <p:nvPr>
+            <p:ph type="sldNum" sz="quarter" idx="12"/>
+          </p:nvPr>
+        </p:nvSpPr>
+        <p:spPr/>
+        <p:txBody>
+          <a:bodyPr/>
+          <a:lstStyle/>
+          <a:p>
+            <a:fld id="{C936BD1D-689F-4FB2-8C94-2D2423F07E62}" type="slidenum">
+              <a:rPr lang="ru-RU" smtClean="0"/>
+              <a:t>13</a:t>
+            </a:fld>
+            <a:endParaRPr lang="ru-RU"/>
+          </a:p>
+        </p:txBody>
+      </p:sp>
+      <p:sp>
+        <p:nvSpPr>
+          <p:cNvPr id="5" name="Заголовок 1"/>
+          <p:cNvSpPr>
+            <a:spLocks noGrp="1"/>
+          </p:cNvSpPr>
+          <p:nvPr>
+            <p:ph type="title"/>
+          </p:nvPr>
+        </p:nvSpPr>
+        <p:spPr>
+          <a:xfrm>
+            <a:off x="628650" y="365127"/>
+            <a:ext cx="7886700" cy="476846"/>
+          </a:xfrm>
+        </p:spPr>
+        <p:txBody>
+          <a:bodyPr vert="horz" lIns="91440" tIns="45720" rIns="91440" bIns="45720" rtlCol="0" anchor="b">
+            <a:noAutofit/>
+          </a:bodyPr>
+          <a:lstStyle/>
+          <a:p>
+            <a:pPr algn="ctr"/>
+            <a:r>
+              <a:rPr lang="en-US" sz="2400" b="1" dirty="0">
+                <a:solidFill>
+                  <a:srgbClr val="00B0F0"/>
+                </a:solidFill>
+              </a:rPr>
+              <a:t>Variance (Measures of deviation</a:t>
+            </a:r>
+            <a:r>
+              <a:rPr lang="en-US" sz="2400" b="1" dirty="0" smtClean="0">
+                <a:solidFill>
+                  <a:srgbClr val="00B0F0"/>
+                </a:solidFill>
+              </a:rPr>
+              <a:t>) – Part 2</a:t>
+            </a:r>
+            <a:endParaRPr lang="ru-RU" sz="2400" b="1" dirty="0">
+              <a:solidFill>
+                <a:srgbClr val="00B0F0"/>
+              </a:solidFill>
+            </a:endParaRPr>
+          </a:p>
+        </p:txBody>
+      </p:sp>
+      <p:pic>
+        <p:nvPicPr>
+          <p:cNvPr id="7" name="Рисунок 6"/>
+          <p:cNvPicPr>
+            <a:picLocks noChangeAspect="1"/>
+          </p:cNvPicPr>
+          <p:nvPr/>
+        </p:nvPicPr>
+        <p:blipFill>
+          <a:blip r:embed="rId2"/>
+          <a:stretch>
+            <a:fillRect/>
+          </a:stretch>
+        </p:blipFill>
+        <p:spPr>
+          <a:xfrm>
+            <a:off x="1072742" y="1146706"/>
+            <a:ext cx="6441752" cy="3687843"/>
+          </a:xfrm>
+          <a:prstGeom prst="rect">
+            <a:avLst/>
+          </a:prstGeom>
+        </p:spPr>
+      </p:pic>
+    </p:spTree>
+    <p:extLst>
+      <p:ext uri="{BB962C8B-B14F-4D97-AF65-F5344CB8AC3E}">
+        <p14:creationId xmlns:p14="http://schemas.microsoft.com/office/powerpoint/2010/main" val="584171230"/>
+      </p:ext>
+    </p:extLst>
+  </p:cSld>
+  <p:clrMapOvr>
+    <a:masterClrMapping/>
+  </p:clrMapOvr>
+</p:sld>
+</file>
+
 <file path=ppt/slides/slide2.xml><?xml version="1.0" encoding="utf-8"?>
 <p:sld xmlns:a="http://schemas.openxmlformats.org/drawingml/2006/main" xmlns:r="http://schemas.openxmlformats.org/officeDocument/2006/relationships" xmlns:p="http://schemas.openxmlformats.org/presentationml/2006/main">
   <p:cSld>
@@ -5530,9 +6258,138 @@
           </a:p>
         </p:txBody>
       </p:sp>
+      <p:sp>
+        <p:nvSpPr>
+          <p:cNvPr id="11" name="Заголовок 1"/>
+          <p:cNvSpPr>
+            <a:spLocks noGrp="1"/>
+          </p:cNvSpPr>
+          <p:nvPr>
+            <p:ph type="title"/>
+          </p:nvPr>
+        </p:nvSpPr>
+        <p:spPr>
+          <a:xfrm>
+            <a:off x="628650" y="365126"/>
+            <a:ext cx="7886700" cy="422525"/>
+          </a:xfrm>
+        </p:spPr>
+        <p:txBody>
+          <a:bodyPr vert="horz" lIns="91440" tIns="45720" rIns="91440" bIns="45720" rtlCol="0" anchor="b">
+            <a:noAutofit/>
+          </a:bodyPr>
+          <a:lstStyle/>
+          <a:p>
+            <a:pPr algn="ctr"/>
+            <a:r>
+              <a:rPr lang="en-US" sz="2400" b="1" dirty="0" smtClean="0">
+                <a:solidFill>
+                  <a:srgbClr val="00B0F0"/>
+                </a:solidFill>
+              </a:rPr>
+              <a:t>Quantiles</a:t>
+            </a:r>
+            <a:endParaRPr lang="ru-RU" sz="2400" b="1" dirty="0">
+              <a:solidFill>
+                <a:srgbClr val="00B0F0"/>
+              </a:solidFill>
+            </a:endParaRPr>
+          </a:p>
+        </p:txBody>
+      </p:sp>
       <p:pic>
         <p:nvPicPr>
-          <p:cNvPr id="10" name="Рисунок 9"/>
+          <p:cNvPr id="12" name="Рисунок 11"/>
+          <p:cNvPicPr>
+            <a:picLocks noChangeAspect="1"/>
+          </p:cNvPicPr>
+          <p:nvPr/>
+        </p:nvPicPr>
+        <p:blipFill>
+          <a:blip r:embed="rId2"/>
+          <a:stretch>
+            <a:fillRect/>
+          </a:stretch>
+        </p:blipFill>
+        <p:spPr>
+          <a:xfrm>
+            <a:off x="3673444" y="1224104"/>
+            <a:ext cx="5298542" cy="3060426"/>
+          </a:xfrm>
+          <a:prstGeom prst="rect">
+            <a:avLst/>
+          </a:prstGeom>
+        </p:spPr>
+      </p:pic>
+      <p:sp>
+        <p:nvSpPr>
+          <p:cNvPr id="13" name="TextBox 12"/>
+          <p:cNvSpPr txBox="1"/>
+          <p:nvPr/>
+        </p:nvSpPr>
+        <p:spPr>
+          <a:xfrm>
+            <a:off x="421049" y="869133"/>
+            <a:ext cx="3069000" cy="369332"/>
+          </a:xfrm>
+          <a:prstGeom prst="rect">
+            <a:avLst/>
+          </a:prstGeom>
+          <a:noFill/>
+        </p:spPr>
+        <p:txBody>
+          <a:bodyPr wrap="square" rtlCol="0">
+            <a:spAutoFit/>
+          </a:bodyPr>
+          <a:lstStyle/>
+          <a:p>
+            <a:r>
+              <a:rPr lang="en-US" dirty="0" smtClean="0">
+                <a:solidFill>
+                  <a:srgbClr val="92D050"/>
+                </a:solidFill>
+              </a:rPr>
+              <a:t>Statistics</a:t>
+            </a:r>
+          </a:p>
+        </p:txBody>
+      </p:sp>
+      <p:sp>
+        <p:nvSpPr>
+          <p:cNvPr id="14" name="TextBox 13"/>
+          <p:cNvSpPr txBox="1"/>
+          <p:nvPr/>
+        </p:nvSpPr>
+        <p:spPr>
+          <a:xfrm>
+            <a:off x="3672973" y="821211"/>
+            <a:ext cx="3069000" cy="369332"/>
+          </a:xfrm>
+          <a:prstGeom prst="rect">
+            <a:avLst/>
+          </a:prstGeom>
+          <a:noFill/>
+        </p:spPr>
+        <p:txBody>
+          <a:bodyPr wrap="square" rtlCol="0">
+            <a:spAutoFit/>
+          </a:bodyPr>
+          <a:lstStyle/>
+          <a:p>
+            <a:r>
+              <a:rPr lang="en-US" dirty="0" smtClean="0">
+                <a:solidFill>
+                  <a:srgbClr val="92D050"/>
+                </a:solidFill>
+              </a:rPr>
+              <a:t>Probability Distribution</a:t>
+            </a:r>
+          </a:p>
+        </p:txBody>
+      </p:sp>
+      <p:pic>
+        <p:nvPicPr>
+          <p:cNvPr id="2" name="Рисунок 1"/>
           <p:cNvPicPr>
             <a:picLocks noChangeAspect="1"/>
           </p:cNvPicPr>
@@ -5546,7 +6403,7 @@
         </p:blipFill>
         <p:spPr>
           <a:xfrm>
-            <a:off x="421049" y="1224104"/>
+            <a:off x="330514" y="1224104"/>
             <a:ext cx="3069000" cy="4041000"/>
           </a:xfrm>
           <a:prstGeom prst="rect">
@@ -5554,135 +6411,6 @@
           </a:prstGeom>
         </p:spPr>
       </p:pic>
-      <p:sp>
-        <p:nvSpPr>
-          <p:cNvPr id="11" name="Заголовок 1"/>
-          <p:cNvSpPr>
-            <a:spLocks noGrp="1"/>
-          </p:cNvSpPr>
-          <p:nvPr>
-            <p:ph type="title"/>
-          </p:nvPr>
-        </p:nvSpPr>
-        <p:spPr>
-          <a:xfrm>
-            <a:off x="628650" y="365126"/>
-            <a:ext cx="7886700" cy="422525"/>
-          </a:xfrm>
-        </p:spPr>
-        <p:txBody>
-          <a:bodyPr vert="horz" lIns="91440" tIns="45720" rIns="91440" bIns="45720" rtlCol="0" anchor="b">
-            <a:noAutofit/>
-          </a:bodyPr>
-          <a:lstStyle/>
-          <a:p>
-            <a:pPr algn="ctr"/>
-            <a:r>
-              <a:rPr lang="en-US" sz="2400" b="1" dirty="0" smtClean="0">
-                <a:solidFill>
-                  <a:srgbClr val="00B0F0"/>
-                </a:solidFill>
-              </a:rPr>
-              <a:t>Quantiles</a:t>
-            </a:r>
-            <a:endParaRPr lang="ru-RU" sz="2400" b="1" dirty="0">
-              <a:solidFill>
-                <a:srgbClr val="00B0F0"/>
-              </a:solidFill>
-            </a:endParaRPr>
-          </a:p>
-        </p:txBody>
-      </p:sp>
-      <p:pic>
-        <p:nvPicPr>
-          <p:cNvPr id="12" name="Рисунок 11"/>
-          <p:cNvPicPr>
-            <a:picLocks noChangeAspect="1"/>
-          </p:cNvPicPr>
-          <p:nvPr/>
-        </p:nvPicPr>
-        <p:blipFill>
-          <a:blip r:embed="rId4"/>
-          <a:stretch>
-            <a:fillRect/>
-          </a:stretch>
-        </p:blipFill>
-        <p:spPr>
-          <a:xfrm>
-            <a:off x="3673444" y="1224104"/>
-            <a:ext cx="5298542" cy="3060426"/>
-          </a:xfrm>
-          <a:prstGeom prst="rect">
-            <a:avLst/>
-          </a:prstGeom>
-        </p:spPr>
-      </p:pic>
-      <p:sp>
-        <p:nvSpPr>
-          <p:cNvPr id="13" name="TextBox 12"/>
-          <p:cNvSpPr txBox="1"/>
-          <p:nvPr/>
-        </p:nvSpPr>
-        <p:spPr>
-          <a:xfrm>
-            <a:off x="421049" y="869133"/>
-            <a:ext cx="3069000" cy="369332"/>
-          </a:xfrm>
-          <a:prstGeom prst="rect">
-            <a:avLst/>
-          </a:prstGeom>
-          <a:noFill/>
-        </p:spPr>
-        <p:txBody>
-          <a:bodyPr wrap="square" rtlCol="0">
-            <a:spAutoFit/>
-          </a:bodyPr>
-          <a:lstStyle/>
-          <a:p>
-            <a:r>
-              <a:rPr lang="en-US" dirty="0" smtClean="0">
-                <a:solidFill>
-                  <a:srgbClr val="92D050"/>
-                </a:solidFill>
-              </a:rPr>
-              <a:t>Statistics</a:t>
-            </a:r>
-          </a:p>
-        </p:txBody>
-      </p:sp>
-      <p:sp>
-        <p:nvSpPr>
-          <p:cNvPr id="14" name="TextBox 13"/>
-          <p:cNvSpPr txBox="1"/>
-          <p:nvPr/>
-        </p:nvSpPr>
-        <p:spPr>
-          <a:xfrm>
-            <a:off x="3672973" y="821211"/>
-            <a:ext cx="3069000" cy="369332"/>
-          </a:xfrm>
-          <a:prstGeom prst="rect">
-            <a:avLst/>
-          </a:prstGeom>
-          <a:noFill/>
-        </p:spPr>
-        <p:txBody>
-          <a:bodyPr wrap="square" rtlCol="0">
-            <a:spAutoFit/>
-          </a:bodyPr>
-          <a:lstStyle/>
-          <a:p>
-            <a:r>
-              <a:rPr lang="en-US" dirty="0" smtClean="0">
-                <a:solidFill>
-                  <a:srgbClr val="92D050"/>
-                </a:solidFill>
-              </a:rPr>
-              <a:t>Probability Distribution</a:t>
-            </a:r>
-          </a:p>
-        </p:txBody>
-      </p:sp>
     </p:spTree>
     <p:extLst>
       <p:ext uri="{BB962C8B-B14F-4D97-AF65-F5344CB8AC3E}">

</xml_diff>

<commit_message>
Covariance and correlation are added.
</commit_message>
<xml_diff>
--- a/Exploratory_Analysis.pptx
+++ b/Exploratory_Analysis.pptx
@@ -5,7 +5,7 @@
     <p:sldMasterId id="2147483660" r:id="rId1"/>
   </p:sldMasterIdLst>
   <p:notesMasterIdLst>
-    <p:notesMasterId r:id="rId15"/>
+    <p:notesMasterId r:id="rId18"/>
   </p:notesMasterIdLst>
   <p:sldIdLst>
     <p:sldId id="257" r:id="rId2"/>
@@ -21,6 +21,9 @@
     <p:sldId id="266" r:id="rId12"/>
     <p:sldId id="267" r:id="rId13"/>
     <p:sldId id="268" r:id="rId14"/>
+    <p:sldId id="269" r:id="rId15"/>
+    <p:sldId id="270" r:id="rId16"/>
+    <p:sldId id="271" r:id="rId17"/>
   </p:sldIdLst>
   <p:sldSz cx="9144000" cy="6858000" type="screen4x3"/>
   <p:notesSz cx="6858000" cy="9144000"/>
@@ -235,7 +238,7 @@
           <a:p>
             <a:fld id="{CD863C69-6AC4-4515-84BB-C614EE551B82}" type="datetimeFigureOut">
               <a:rPr lang="ru-RU" smtClean="0"/>
-              <a:t>05.06.2019</a:t>
+              <a:t>06.06.2019</a:t>
             </a:fld>
             <a:endParaRPr lang="ru-RU"/>
           </a:p>
@@ -634,7 +637,7 @@
           <a:p>
             <a:fld id="{BF38C05E-219E-4729-9909-5B693F1E4DB2}" type="datetime1">
               <a:rPr lang="ru-RU" smtClean="0"/>
-              <a:t>05.06.2019</a:t>
+              <a:t>06.06.2019</a:t>
             </a:fld>
             <a:endParaRPr lang="ru-RU"/>
           </a:p>
@@ -804,7 +807,7 @@
           <a:p>
             <a:fld id="{E587BD1D-74D3-449F-A3CA-F47BBACDADC1}" type="datetime1">
               <a:rPr lang="ru-RU" smtClean="0"/>
-              <a:t>05.06.2019</a:t>
+              <a:t>06.06.2019</a:t>
             </a:fld>
             <a:endParaRPr lang="ru-RU"/>
           </a:p>
@@ -984,7 +987,7 @@
           <a:p>
             <a:fld id="{F156E365-3C59-403F-A598-8903968D44C1}" type="datetime1">
               <a:rPr lang="ru-RU" smtClean="0"/>
-              <a:t>05.06.2019</a:t>
+              <a:t>06.06.2019</a:t>
             </a:fld>
             <a:endParaRPr lang="ru-RU"/>
           </a:p>
@@ -1154,7 +1157,7 @@
           <a:p>
             <a:fld id="{D71D973D-7295-497C-A5AE-B81A0C1EA542}" type="datetime1">
               <a:rPr lang="ru-RU" smtClean="0"/>
-              <a:t>05.06.2019</a:t>
+              <a:t>06.06.2019</a:t>
             </a:fld>
             <a:endParaRPr lang="ru-RU"/>
           </a:p>
@@ -1398,7 +1401,7 @@
           <a:p>
             <a:fld id="{D43ACA65-1DF0-4542-9513-2573006F2B09}" type="datetime1">
               <a:rPr lang="ru-RU" smtClean="0"/>
-              <a:t>05.06.2019</a:t>
+              <a:t>06.06.2019</a:t>
             </a:fld>
             <a:endParaRPr lang="ru-RU"/>
           </a:p>
@@ -1630,7 +1633,7 @@
           <a:p>
             <a:fld id="{CE5D4F0D-BE92-42E2-AC19-D4AE919B8EEA}" type="datetime1">
               <a:rPr lang="ru-RU" smtClean="0"/>
-              <a:t>05.06.2019</a:t>
+              <a:t>06.06.2019</a:t>
             </a:fld>
             <a:endParaRPr lang="ru-RU"/>
           </a:p>
@@ -1997,7 +2000,7 @@
           <a:p>
             <a:fld id="{31712A4F-404C-4E2A-B048-29FEE1F56BCC}" type="datetime1">
               <a:rPr lang="ru-RU" smtClean="0"/>
-              <a:t>05.06.2019</a:t>
+              <a:t>06.06.2019</a:t>
             </a:fld>
             <a:endParaRPr lang="ru-RU"/>
           </a:p>
@@ -2115,7 +2118,7 @@
           <a:p>
             <a:fld id="{A591E32F-21C9-4A73-9D8C-CB8422C8AD99}" type="datetime1">
               <a:rPr lang="ru-RU" smtClean="0"/>
-              <a:t>05.06.2019</a:t>
+              <a:t>06.06.2019</a:t>
             </a:fld>
             <a:endParaRPr lang="ru-RU"/>
           </a:p>
@@ -2210,7 +2213,7 @@
           <a:p>
             <a:fld id="{E8BE7035-4758-4463-AF71-B436150BF40F}" type="datetime1">
               <a:rPr lang="ru-RU" smtClean="0"/>
-              <a:t>05.06.2019</a:t>
+              <a:t>06.06.2019</a:t>
             </a:fld>
             <a:endParaRPr lang="ru-RU"/>
           </a:p>
@@ -2487,7 +2490,7 @@
           <a:p>
             <a:fld id="{8BF22BB4-229E-48DC-A891-0BD3792CC568}" type="datetime1">
               <a:rPr lang="ru-RU" smtClean="0"/>
-              <a:t>05.06.2019</a:t>
+              <a:t>06.06.2019</a:t>
             </a:fld>
             <a:endParaRPr lang="ru-RU"/>
           </a:p>
@@ -2744,7 +2747,7 @@
           <a:p>
             <a:fld id="{B32F65DE-1A63-4DFF-816D-2C4DB2F0AABF}" type="datetime1">
               <a:rPr lang="ru-RU" smtClean="0"/>
-              <a:t>05.06.2019</a:t>
+              <a:t>06.06.2019</a:t>
             </a:fld>
             <a:endParaRPr lang="ru-RU"/>
           </a:p>
@@ -2957,7 +2960,7 @@
           <a:p>
             <a:fld id="{58F37F58-E97F-4EAB-9CA9-C9A7312871A5}" type="datetime1">
               <a:rPr lang="ru-RU" smtClean="0"/>
-              <a:t>05.06.2019</a:t>
+              <a:t>06.06.2019</a:t>
             </a:fld>
             <a:endParaRPr lang="ru-RU"/>
           </a:p>
@@ -4349,6 +4352,950 @@
     <p:extLst>
       <p:ext uri="{BB962C8B-B14F-4D97-AF65-F5344CB8AC3E}">
         <p14:creationId xmlns:p14="http://schemas.microsoft.com/office/powerpoint/2010/main" val="584171230"/>
+      </p:ext>
+    </p:extLst>
+  </p:cSld>
+  <p:clrMapOvr>
+    <a:masterClrMapping/>
+  </p:clrMapOvr>
+</p:sld>
+</file>
+
+<file path=ppt/slides/slide14.xml><?xml version="1.0" encoding="utf-8"?>
+<p:sld xmlns:a="http://schemas.openxmlformats.org/drawingml/2006/main" xmlns:r="http://schemas.openxmlformats.org/officeDocument/2006/relationships" xmlns:p="http://schemas.openxmlformats.org/presentationml/2006/main">
+  <p:cSld>
+    <p:spTree>
+      <p:nvGrpSpPr>
+        <p:cNvPr id="1" name=""/>
+        <p:cNvGrpSpPr/>
+        <p:nvPr/>
+      </p:nvGrpSpPr>
+      <p:grpSpPr>
+        <a:xfrm>
+          <a:off x="0" y="0"/>
+          <a:ext cx="0" cy="0"/>
+          <a:chOff x="0" y="0"/>
+          <a:chExt cx="0" cy="0"/>
+        </a:xfrm>
+      </p:grpSpPr>
+      <p:sp>
+        <p:nvSpPr>
+          <p:cNvPr id="4" name="Номер слайда 3"/>
+          <p:cNvSpPr>
+            <a:spLocks noGrp="1"/>
+          </p:cNvSpPr>
+          <p:nvPr>
+            <p:ph type="sldNum" sz="quarter" idx="12"/>
+          </p:nvPr>
+        </p:nvSpPr>
+        <p:spPr/>
+        <p:txBody>
+          <a:bodyPr/>
+          <a:lstStyle/>
+          <a:p>
+            <a:fld id="{C936BD1D-689F-4FB2-8C94-2D2423F07E62}" type="slidenum">
+              <a:rPr lang="ru-RU" smtClean="0"/>
+              <a:t>14</a:t>
+            </a:fld>
+            <a:endParaRPr lang="ru-RU"/>
+          </a:p>
+        </p:txBody>
+      </p:sp>
+      <p:sp>
+        <p:nvSpPr>
+          <p:cNvPr id="5" name="Заголовок 1"/>
+          <p:cNvSpPr>
+            <a:spLocks noGrp="1"/>
+          </p:cNvSpPr>
+          <p:nvPr>
+            <p:ph type="title"/>
+          </p:nvPr>
+        </p:nvSpPr>
+        <p:spPr>
+          <a:xfrm>
+            <a:off x="628650" y="365127"/>
+            <a:ext cx="7886700" cy="476846"/>
+          </a:xfrm>
+        </p:spPr>
+        <p:txBody>
+          <a:bodyPr vert="horz" lIns="91440" tIns="45720" rIns="91440" bIns="45720" rtlCol="0" anchor="b">
+            <a:noAutofit/>
+          </a:bodyPr>
+          <a:lstStyle/>
+          <a:p>
+            <a:pPr algn="ctr"/>
+            <a:r>
+              <a:rPr lang="en-US" sz="2400" b="1" dirty="0" smtClean="0">
+                <a:solidFill>
+                  <a:srgbClr val="00B0F0"/>
+                </a:solidFill>
+              </a:rPr>
+              <a:t>Covariance</a:t>
+            </a:r>
+            <a:endParaRPr lang="ru-RU" sz="2400" b="1" dirty="0">
+              <a:solidFill>
+                <a:srgbClr val="00B0F0"/>
+              </a:solidFill>
+            </a:endParaRPr>
+          </a:p>
+        </p:txBody>
+      </p:sp>
+      <p:pic>
+        <p:nvPicPr>
+          <p:cNvPr id="6" name="Рисунок 5"/>
+          <p:cNvPicPr>
+            <a:picLocks noChangeAspect="1"/>
+          </p:cNvPicPr>
+          <p:nvPr/>
+        </p:nvPicPr>
+        <p:blipFill>
+          <a:blip r:embed="rId2"/>
+          <a:stretch>
+            <a:fillRect/>
+          </a:stretch>
+        </p:blipFill>
+        <p:spPr>
+          <a:xfrm>
+            <a:off x="295746" y="923454"/>
+            <a:ext cx="3815079" cy="584184"/>
+          </a:xfrm>
+          <a:prstGeom prst="rect">
+            <a:avLst/>
+          </a:prstGeom>
+        </p:spPr>
+      </p:pic>
+      <p:sp>
+        <p:nvSpPr>
+          <p:cNvPr id="7" name="Прямоугольник 6"/>
+          <p:cNvSpPr/>
+          <p:nvPr/>
+        </p:nvSpPr>
+        <p:spPr>
+          <a:xfrm>
+            <a:off x="4357202" y="1030880"/>
+            <a:ext cx="4050981" cy="369332"/>
+          </a:xfrm>
+          <a:prstGeom prst="rect">
+            <a:avLst/>
+          </a:prstGeom>
+        </p:spPr>
+        <p:txBody>
+          <a:bodyPr wrap="none">
+            <a:spAutoFit/>
+          </a:bodyPr>
+          <a:lstStyle/>
+          <a:p>
+            <a:r>
+              <a:rPr lang="en-US" dirty="0">
+                <a:hlinkClick r:id="rId3"/>
+              </a:rPr>
+              <a:t>https://en.wikipedia.org/wiki/Covariance</a:t>
+            </a:r>
+            <a:endParaRPr lang="ru-RU" dirty="0"/>
+          </a:p>
+        </p:txBody>
+      </p:sp>
+      <p:sp>
+        <p:nvSpPr>
+          <p:cNvPr id="8" name="TextBox 7"/>
+          <p:cNvSpPr txBox="1"/>
+          <p:nvPr/>
+        </p:nvSpPr>
+        <p:spPr>
+          <a:xfrm>
+            <a:off x="295746" y="1809126"/>
+            <a:ext cx="8514845" cy="830997"/>
+          </a:xfrm>
+          <a:prstGeom prst="rect">
+            <a:avLst/>
+          </a:prstGeom>
+          <a:noFill/>
+        </p:spPr>
+        <p:txBody>
+          <a:bodyPr wrap="square" rtlCol="0">
+            <a:spAutoFit/>
+          </a:bodyPr>
+          <a:lstStyle/>
+          <a:p>
+            <a:r>
+              <a:rPr lang="en-US" sz="1600" dirty="0"/>
+              <a:t>w</a:t>
+            </a:r>
+            <a:r>
+              <a:rPr lang="en-US" sz="1600" dirty="0" smtClean="0"/>
+              <a:t>here </a:t>
+            </a:r>
+            <a:r>
+              <a:rPr lang="en-US" sz="1600" dirty="0" smtClean="0">
+                <a:solidFill>
+                  <a:srgbClr val="00B0F0"/>
+                </a:solidFill>
+              </a:rPr>
+              <a:t>n</a:t>
+            </a:r>
+            <a:r>
+              <a:rPr lang="en-US" sz="1600" dirty="0" smtClean="0"/>
+              <a:t> – quantity of observations, </a:t>
+            </a:r>
+          </a:p>
+          <a:p>
+            <a:r>
+              <a:rPr lang="en-US" sz="1600" dirty="0" smtClean="0">
+                <a:solidFill>
+                  <a:srgbClr val="00B0F0"/>
+                </a:solidFill>
+              </a:rPr>
+              <a:t>x</a:t>
+            </a:r>
+            <a:r>
+              <a:rPr lang="en-US" sz="1600" dirty="0" smtClean="0">
+                <a:solidFill>
+                  <a:srgbClr val="FF0000"/>
+                </a:solidFill>
+              </a:rPr>
+              <a:t> </a:t>
+            </a:r>
+            <a:r>
+              <a:rPr lang="en-US" sz="1600" dirty="0" smtClean="0"/>
+              <a:t>and </a:t>
+            </a:r>
+            <a:r>
+              <a:rPr lang="en-US" sz="1600" dirty="0" smtClean="0">
+                <a:solidFill>
+                  <a:srgbClr val="00B0F0"/>
+                </a:solidFill>
+              </a:rPr>
+              <a:t>y</a:t>
+            </a:r>
+            <a:r>
+              <a:rPr lang="en-US" sz="1600" dirty="0" smtClean="0"/>
+              <a:t> are random variables</a:t>
+            </a:r>
+          </a:p>
+          <a:p>
+            <a:r>
+              <a:rPr lang="en-US" sz="1600" dirty="0" smtClean="0">
+                <a:solidFill>
+                  <a:srgbClr val="00B0F0"/>
+                </a:solidFill>
+              </a:rPr>
+              <a:t>E(x)</a:t>
+            </a:r>
+            <a:r>
+              <a:rPr lang="en-US" sz="1600" dirty="0" smtClean="0"/>
+              <a:t>, </a:t>
+            </a:r>
+            <a:r>
+              <a:rPr lang="en-US" sz="1600" dirty="0" smtClean="0">
+                <a:solidFill>
+                  <a:srgbClr val="00B0F0"/>
+                </a:solidFill>
+              </a:rPr>
+              <a:t>E(y)</a:t>
+            </a:r>
+            <a:r>
+              <a:rPr lang="en-US" sz="1600" dirty="0" smtClean="0"/>
+              <a:t> – expected value / mean</a:t>
+            </a:r>
+          </a:p>
+        </p:txBody>
+      </p:sp>
+      <p:sp>
+        <p:nvSpPr>
+          <p:cNvPr id="9" name="TextBox 8"/>
+          <p:cNvSpPr txBox="1"/>
+          <p:nvPr/>
+        </p:nvSpPr>
+        <p:spPr>
+          <a:xfrm>
+            <a:off x="357550" y="3190937"/>
+            <a:ext cx="8514845" cy="707886"/>
+          </a:xfrm>
+          <a:prstGeom prst="rect">
+            <a:avLst/>
+          </a:prstGeom>
+          <a:noFill/>
+        </p:spPr>
+        <p:txBody>
+          <a:bodyPr wrap="square" rtlCol="0">
+            <a:spAutoFit/>
+          </a:bodyPr>
+          <a:lstStyle/>
+          <a:p>
+            <a:pPr algn="just"/>
+            <a:r>
+              <a:rPr lang="en-US" sz="2000" dirty="0" smtClean="0"/>
+              <a:t>The </a:t>
+            </a:r>
+            <a:r>
+              <a:rPr lang="en-US" sz="2000" b="1" dirty="0" smtClean="0"/>
+              <a:t>major disadvantage </a:t>
+            </a:r>
+            <a:r>
+              <a:rPr lang="en-US" sz="2000" dirty="0" smtClean="0"/>
+              <a:t>of covariance is </a:t>
+            </a:r>
+            <a:r>
+              <a:rPr lang="en-US" sz="2000" i="1" u="sng" dirty="0" smtClean="0"/>
+              <a:t>no limit </a:t>
+            </a:r>
+            <a:r>
+              <a:rPr lang="en-US" sz="2000" dirty="0" smtClean="0"/>
+              <a:t>to estimate the covariance value.</a:t>
+            </a:r>
+          </a:p>
+        </p:txBody>
+      </p:sp>
+      <p:sp>
+        <p:nvSpPr>
+          <p:cNvPr id="10" name="TextBox 9"/>
+          <p:cNvSpPr txBox="1"/>
+          <p:nvPr/>
+        </p:nvSpPr>
+        <p:spPr>
+          <a:xfrm>
+            <a:off x="295745" y="4727477"/>
+            <a:ext cx="8514845" cy="400110"/>
+          </a:xfrm>
+          <a:prstGeom prst="rect">
+            <a:avLst/>
+          </a:prstGeom>
+          <a:noFill/>
+        </p:spPr>
+        <p:txBody>
+          <a:bodyPr wrap="square" rtlCol="0">
+            <a:spAutoFit/>
+          </a:bodyPr>
+          <a:lstStyle/>
+          <a:p>
+            <a:pPr algn="just"/>
+            <a:r>
+              <a:rPr lang="en-US" sz="2000" dirty="0" smtClean="0"/>
+              <a:t>The correlation is use to remove the drawback of covariance.</a:t>
+            </a:r>
+          </a:p>
+        </p:txBody>
+      </p:sp>
+    </p:spTree>
+    <p:extLst>
+      <p:ext uri="{BB962C8B-B14F-4D97-AF65-F5344CB8AC3E}">
+        <p14:creationId xmlns:p14="http://schemas.microsoft.com/office/powerpoint/2010/main" val="199623148"/>
+      </p:ext>
+    </p:extLst>
+  </p:cSld>
+  <p:clrMapOvr>
+    <a:masterClrMapping/>
+  </p:clrMapOvr>
+</p:sld>
+</file>
+
+<file path=ppt/slides/slide15.xml><?xml version="1.0" encoding="utf-8"?>
+<p:sld xmlns:a="http://schemas.openxmlformats.org/drawingml/2006/main" xmlns:r="http://schemas.openxmlformats.org/officeDocument/2006/relationships" xmlns:p="http://schemas.openxmlformats.org/presentationml/2006/main">
+  <p:cSld>
+    <p:spTree>
+      <p:nvGrpSpPr>
+        <p:cNvPr id="1" name=""/>
+        <p:cNvGrpSpPr/>
+        <p:nvPr/>
+      </p:nvGrpSpPr>
+      <p:grpSpPr>
+        <a:xfrm>
+          <a:off x="0" y="0"/>
+          <a:ext cx="0" cy="0"/>
+          <a:chOff x="0" y="0"/>
+          <a:chExt cx="0" cy="0"/>
+        </a:xfrm>
+      </p:grpSpPr>
+      <p:sp>
+        <p:nvSpPr>
+          <p:cNvPr id="4" name="Номер слайда 3"/>
+          <p:cNvSpPr>
+            <a:spLocks noGrp="1"/>
+          </p:cNvSpPr>
+          <p:nvPr>
+            <p:ph type="sldNum" sz="quarter" idx="12"/>
+          </p:nvPr>
+        </p:nvSpPr>
+        <p:spPr/>
+        <p:txBody>
+          <a:bodyPr/>
+          <a:lstStyle/>
+          <a:p>
+            <a:fld id="{C936BD1D-689F-4FB2-8C94-2D2423F07E62}" type="slidenum">
+              <a:rPr lang="ru-RU" smtClean="0"/>
+              <a:t>15</a:t>
+            </a:fld>
+            <a:endParaRPr lang="ru-RU"/>
+          </a:p>
+        </p:txBody>
+      </p:sp>
+      <p:sp>
+        <p:nvSpPr>
+          <p:cNvPr id="5" name="Заголовок 1"/>
+          <p:cNvSpPr>
+            <a:spLocks noGrp="1"/>
+          </p:cNvSpPr>
+          <p:nvPr>
+            <p:ph type="title"/>
+          </p:nvPr>
+        </p:nvSpPr>
+        <p:spPr>
+          <a:xfrm>
+            <a:off x="628650" y="365127"/>
+            <a:ext cx="7886700" cy="476846"/>
+          </a:xfrm>
+        </p:spPr>
+        <p:txBody>
+          <a:bodyPr vert="horz" lIns="91440" tIns="45720" rIns="91440" bIns="45720" rtlCol="0" anchor="b">
+            <a:noAutofit/>
+          </a:bodyPr>
+          <a:lstStyle/>
+          <a:p>
+            <a:pPr algn="ctr"/>
+            <a:r>
+              <a:rPr lang="en-US" sz="2400" b="1" dirty="0" smtClean="0">
+                <a:solidFill>
+                  <a:srgbClr val="00B0F0"/>
+                </a:solidFill>
+              </a:rPr>
+              <a:t>Correlation</a:t>
+            </a:r>
+            <a:endParaRPr lang="ru-RU" sz="2400" b="1" dirty="0">
+              <a:solidFill>
+                <a:srgbClr val="00B0F0"/>
+              </a:solidFill>
+            </a:endParaRPr>
+          </a:p>
+        </p:txBody>
+      </p:sp>
+      <p:pic>
+        <p:nvPicPr>
+          <p:cNvPr id="7" name="Рисунок 6"/>
+          <p:cNvPicPr>
+            <a:picLocks noChangeAspect="1"/>
+          </p:cNvPicPr>
+          <p:nvPr/>
+        </p:nvPicPr>
+        <p:blipFill>
+          <a:blip r:embed="rId2"/>
+          <a:stretch>
+            <a:fillRect/>
+          </a:stretch>
+        </p:blipFill>
+        <p:spPr>
+          <a:xfrm>
+            <a:off x="175457" y="1052370"/>
+            <a:ext cx="4067175" cy="552450"/>
+          </a:xfrm>
+          <a:prstGeom prst="rect">
+            <a:avLst/>
+          </a:prstGeom>
+        </p:spPr>
+      </p:pic>
+      <p:sp>
+        <p:nvSpPr>
+          <p:cNvPr id="8" name="Прямоугольник 7"/>
+          <p:cNvSpPr/>
+          <p:nvPr/>
+        </p:nvSpPr>
+        <p:spPr>
+          <a:xfrm>
+            <a:off x="4242632" y="1086319"/>
+            <a:ext cx="4572000" cy="307777"/>
+          </a:xfrm>
+          <a:prstGeom prst="rect">
+            <a:avLst/>
+          </a:prstGeom>
+        </p:spPr>
+        <p:txBody>
+          <a:bodyPr>
+            <a:spAutoFit/>
+          </a:bodyPr>
+          <a:lstStyle/>
+          <a:p>
+            <a:r>
+              <a:rPr lang="en-US" sz="1400" dirty="0">
+                <a:hlinkClick r:id="rId3"/>
+              </a:rPr>
+              <a:t>https://en.wikipedia.org/wiki/Correlation_and_dependence</a:t>
+            </a:r>
+            <a:endParaRPr lang="ru-RU" sz="1400" dirty="0"/>
+          </a:p>
+        </p:txBody>
+      </p:sp>
+      <p:sp>
+        <p:nvSpPr>
+          <p:cNvPr id="10" name="TextBox 9"/>
+          <p:cNvSpPr txBox="1"/>
+          <p:nvPr/>
+        </p:nvSpPr>
+        <p:spPr>
+          <a:xfrm>
+            <a:off x="175457" y="1815217"/>
+            <a:ext cx="8514845" cy="830997"/>
+          </a:xfrm>
+          <a:prstGeom prst="rect">
+            <a:avLst/>
+          </a:prstGeom>
+          <a:noFill/>
+        </p:spPr>
+        <p:txBody>
+          <a:bodyPr wrap="square" rtlCol="0">
+            <a:spAutoFit/>
+          </a:bodyPr>
+          <a:lstStyle/>
+          <a:p>
+            <a:r>
+              <a:rPr lang="en-US" sz="1600" dirty="0"/>
+              <a:t>w</a:t>
+            </a:r>
+            <a:r>
+              <a:rPr lang="en-US" sz="1600" dirty="0" smtClean="0"/>
+              <a:t>here </a:t>
+            </a:r>
+            <a:r>
+              <a:rPr lang="en-US" sz="1600" dirty="0" err="1" smtClean="0">
+                <a:solidFill>
+                  <a:srgbClr val="00B0F0"/>
+                </a:solidFill>
+              </a:rPr>
+              <a:t>cov</a:t>
+            </a:r>
+            <a:r>
+              <a:rPr lang="en-US" sz="1600" dirty="0" smtClean="0">
+                <a:solidFill>
+                  <a:srgbClr val="00B0F0"/>
+                </a:solidFill>
+              </a:rPr>
+              <a:t>(X, Y)</a:t>
+            </a:r>
+            <a:r>
+              <a:rPr lang="en-US" sz="1600" dirty="0" smtClean="0"/>
+              <a:t> – covariance of two variables, </a:t>
+            </a:r>
+          </a:p>
+          <a:p>
+            <a:r>
+              <a:rPr lang="en-US" sz="1600" dirty="0" smtClean="0">
+                <a:solidFill>
+                  <a:srgbClr val="00B0F0"/>
+                </a:solidFill>
+              </a:rPr>
+              <a:t>X</a:t>
+            </a:r>
+            <a:r>
+              <a:rPr lang="en-US" sz="1600" dirty="0" smtClean="0">
+                <a:solidFill>
+                  <a:srgbClr val="FF0000"/>
+                </a:solidFill>
+              </a:rPr>
+              <a:t> </a:t>
+            </a:r>
+            <a:r>
+              <a:rPr lang="en-US" sz="1600" dirty="0" smtClean="0"/>
+              <a:t>and </a:t>
+            </a:r>
+            <a:r>
+              <a:rPr lang="en-US" sz="1600" dirty="0">
+                <a:solidFill>
+                  <a:srgbClr val="00B0F0"/>
+                </a:solidFill>
+              </a:rPr>
+              <a:t>X</a:t>
+            </a:r>
+            <a:r>
+              <a:rPr lang="en-US" sz="1600" dirty="0" smtClean="0"/>
+              <a:t> are random variables</a:t>
+            </a:r>
+          </a:p>
+          <a:p>
+            <a:r>
+              <a:rPr lang="uk-UA" sz="1600" dirty="0" smtClean="0">
+                <a:solidFill>
+                  <a:srgbClr val="00B0F0"/>
+                </a:solidFill>
+              </a:rPr>
+              <a:t>µ</a:t>
+            </a:r>
+            <a:r>
+              <a:rPr lang="en-US" sz="1600" dirty="0" smtClean="0">
+                <a:solidFill>
+                  <a:srgbClr val="00B0F0"/>
+                </a:solidFill>
+              </a:rPr>
+              <a:t>(x)</a:t>
+            </a:r>
+            <a:r>
+              <a:rPr lang="en-US" sz="1600" dirty="0" smtClean="0"/>
+              <a:t>, </a:t>
+            </a:r>
+            <a:r>
+              <a:rPr lang="uk-UA" sz="1600" dirty="0">
+                <a:solidFill>
+                  <a:srgbClr val="00B0F0"/>
+                </a:solidFill>
+              </a:rPr>
+              <a:t>µ</a:t>
+            </a:r>
+            <a:r>
+              <a:rPr lang="en-US" sz="1600" dirty="0" smtClean="0">
+                <a:solidFill>
+                  <a:srgbClr val="00B0F0"/>
+                </a:solidFill>
+              </a:rPr>
+              <a:t>(y)</a:t>
+            </a:r>
+            <a:r>
+              <a:rPr lang="en-US" sz="1600" dirty="0" smtClean="0"/>
+              <a:t> – mean</a:t>
+            </a:r>
+          </a:p>
+        </p:txBody>
+      </p:sp>
+      <p:sp>
+        <p:nvSpPr>
+          <p:cNvPr id="11" name="TextBox 10"/>
+          <p:cNvSpPr txBox="1"/>
+          <p:nvPr/>
+        </p:nvSpPr>
+        <p:spPr>
+          <a:xfrm>
+            <a:off x="175456" y="2940587"/>
+            <a:ext cx="8339893" cy="1200329"/>
+          </a:xfrm>
+          <a:prstGeom prst="rect">
+            <a:avLst/>
+          </a:prstGeom>
+          <a:noFill/>
+        </p:spPr>
+        <p:txBody>
+          <a:bodyPr wrap="square" rtlCol="0">
+            <a:spAutoFit/>
+          </a:bodyPr>
+          <a:lstStyle/>
+          <a:p>
+            <a:r>
+              <a:rPr lang="en-US" b="1" dirty="0" smtClean="0"/>
+              <a:t>Range of </a:t>
+            </a:r>
+            <a:r>
+              <a:rPr lang="el-GR" b="1" dirty="0" smtClean="0"/>
+              <a:t>ρ</a:t>
+            </a:r>
+            <a:r>
+              <a:rPr lang="en-US" b="1" dirty="0" smtClean="0"/>
+              <a:t>X,Y: -1 … 1</a:t>
+            </a:r>
+          </a:p>
+          <a:p>
+            <a:r>
+              <a:rPr lang="el-GR" dirty="0"/>
+              <a:t>ρ</a:t>
+            </a:r>
+            <a:r>
+              <a:rPr lang="en-US" dirty="0" smtClean="0"/>
+              <a:t>X,Y -&gt; 1 : both variable are moving in the same direction (strong relationship) </a:t>
+            </a:r>
+            <a:endParaRPr lang="en-US" dirty="0"/>
+          </a:p>
+          <a:p>
+            <a:r>
+              <a:rPr lang="el-GR" dirty="0"/>
+              <a:t>ρ</a:t>
+            </a:r>
+            <a:r>
+              <a:rPr lang="en-US" dirty="0"/>
+              <a:t>X,Y -&gt; 1 : both variable are moving in the </a:t>
+            </a:r>
+            <a:r>
+              <a:rPr lang="en-US" dirty="0" smtClean="0"/>
+              <a:t>opposite direction (strong relationship)</a:t>
+            </a:r>
+          </a:p>
+          <a:p>
+            <a:r>
+              <a:rPr lang="el-GR" dirty="0"/>
+              <a:t>ρ</a:t>
+            </a:r>
+            <a:r>
+              <a:rPr lang="en-US" dirty="0"/>
+              <a:t>X,Y -&gt; </a:t>
+            </a:r>
+            <a:r>
+              <a:rPr lang="en-US" dirty="0" smtClean="0"/>
+              <a:t>0 : no explicit relationship between variables is found</a:t>
+            </a:r>
+            <a:endParaRPr lang="ru-RU" b="1" dirty="0"/>
+          </a:p>
+        </p:txBody>
+      </p:sp>
+      <p:sp>
+        <p:nvSpPr>
+          <p:cNvPr id="12" name="TextBox 11"/>
+          <p:cNvSpPr txBox="1"/>
+          <p:nvPr/>
+        </p:nvSpPr>
+        <p:spPr>
+          <a:xfrm>
+            <a:off x="175456" y="4399984"/>
+            <a:ext cx="8436805" cy="1200329"/>
+          </a:xfrm>
+          <a:prstGeom prst="rect">
+            <a:avLst/>
+          </a:prstGeom>
+          <a:noFill/>
+        </p:spPr>
+        <p:txBody>
+          <a:bodyPr wrap="square" rtlCol="0">
+            <a:spAutoFit/>
+          </a:bodyPr>
+          <a:lstStyle/>
+          <a:p>
+            <a:r>
+              <a:rPr lang="en-US" dirty="0" smtClean="0"/>
+              <a:t>Correlation coefficient (</a:t>
+            </a:r>
+            <a:r>
+              <a:rPr lang="el-GR" dirty="0"/>
+              <a:t>ρ</a:t>
+            </a:r>
+            <a:r>
+              <a:rPr lang="en-US" dirty="0" smtClean="0"/>
+              <a:t>X,Y) demonstrate </a:t>
+            </a:r>
+            <a:r>
+              <a:rPr lang="en-US" b="1" dirty="0" smtClean="0"/>
+              <a:t>the presence of linear relationship </a:t>
+            </a:r>
+            <a:r>
+              <a:rPr lang="en-US" dirty="0" smtClean="0"/>
+              <a:t>between two variable.</a:t>
+            </a:r>
+          </a:p>
+          <a:p>
+            <a:endParaRPr lang="en-US" dirty="0"/>
+          </a:p>
+          <a:p>
+            <a:r>
+              <a:rPr lang="en-US" dirty="0" smtClean="0"/>
+              <a:t>Based upon </a:t>
+            </a:r>
+            <a:r>
+              <a:rPr lang="el-GR" dirty="0"/>
+              <a:t>ρ</a:t>
+            </a:r>
+            <a:r>
+              <a:rPr lang="en-US" dirty="0" smtClean="0"/>
+              <a:t>X,Y the correlation matrix is created. </a:t>
+            </a:r>
+            <a:endParaRPr lang="ru-RU" dirty="0"/>
+          </a:p>
+        </p:txBody>
+      </p:sp>
+    </p:spTree>
+    <p:extLst>
+      <p:ext uri="{BB962C8B-B14F-4D97-AF65-F5344CB8AC3E}">
+        <p14:creationId xmlns:p14="http://schemas.microsoft.com/office/powerpoint/2010/main" val="2453106290"/>
+      </p:ext>
+    </p:extLst>
+  </p:cSld>
+  <p:clrMapOvr>
+    <a:masterClrMapping/>
+  </p:clrMapOvr>
+</p:sld>
+</file>
+
+<file path=ppt/slides/slide16.xml><?xml version="1.0" encoding="utf-8"?>
+<p:sld xmlns:a="http://schemas.openxmlformats.org/drawingml/2006/main" xmlns:r="http://schemas.openxmlformats.org/officeDocument/2006/relationships" xmlns:p="http://schemas.openxmlformats.org/presentationml/2006/main">
+  <p:cSld>
+    <p:spTree>
+      <p:nvGrpSpPr>
+        <p:cNvPr id="1" name=""/>
+        <p:cNvGrpSpPr/>
+        <p:nvPr/>
+      </p:nvGrpSpPr>
+      <p:grpSpPr>
+        <a:xfrm>
+          <a:off x="0" y="0"/>
+          <a:ext cx="0" cy="0"/>
+          <a:chOff x="0" y="0"/>
+          <a:chExt cx="0" cy="0"/>
+        </a:xfrm>
+      </p:grpSpPr>
+      <p:sp>
+        <p:nvSpPr>
+          <p:cNvPr id="4" name="Номер слайда 3"/>
+          <p:cNvSpPr>
+            <a:spLocks noGrp="1"/>
+          </p:cNvSpPr>
+          <p:nvPr>
+            <p:ph type="sldNum" sz="quarter" idx="12"/>
+          </p:nvPr>
+        </p:nvSpPr>
+        <p:spPr/>
+        <p:txBody>
+          <a:bodyPr/>
+          <a:lstStyle/>
+          <a:p>
+            <a:fld id="{C936BD1D-689F-4FB2-8C94-2D2423F07E62}" type="slidenum">
+              <a:rPr lang="ru-RU" smtClean="0"/>
+              <a:t>16</a:t>
+            </a:fld>
+            <a:endParaRPr lang="ru-RU"/>
+          </a:p>
+        </p:txBody>
+      </p:sp>
+      <p:sp>
+        <p:nvSpPr>
+          <p:cNvPr id="5" name="Заголовок 1"/>
+          <p:cNvSpPr>
+            <a:spLocks noGrp="1"/>
+          </p:cNvSpPr>
+          <p:nvPr>
+            <p:ph type="title"/>
+          </p:nvPr>
+        </p:nvSpPr>
+        <p:spPr>
+          <a:xfrm>
+            <a:off x="628650" y="365127"/>
+            <a:ext cx="7886700" cy="476846"/>
+          </a:xfrm>
+        </p:spPr>
+        <p:txBody>
+          <a:bodyPr vert="horz" lIns="91440" tIns="45720" rIns="91440" bIns="45720" rtlCol="0" anchor="b">
+            <a:noAutofit/>
+          </a:bodyPr>
+          <a:lstStyle/>
+          <a:p>
+            <a:pPr algn="ctr"/>
+            <a:r>
+              <a:rPr lang="en-US" sz="2400" b="1" dirty="0" smtClean="0">
+                <a:solidFill>
+                  <a:srgbClr val="00B0F0"/>
+                </a:solidFill>
+              </a:rPr>
+              <a:t>Covariance &amp; Correlation </a:t>
+            </a:r>
+            <a:endParaRPr lang="ru-RU" sz="2400" b="1" dirty="0">
+              <a:solidFill>
+                <a:srgbClr val="00B0F0"/>
+              </a:solidFill>
+            </a:endParaRPr>
+          </a:p>
+        </p:txBody>
+      </p:sp>
+      <p:sp>
+        <p:nvSpPr>
+          <p:cNvPr id="7" name="TextBox 6"/>
+          <p:cNvSpPr txBox="1"/>
+          <p:nvPr/>
+        </p:nvSpPr>
+        <p:spPr>
+          <a:xfrm>
+            <a:off x="473961" y="923453"/>
+            <a:ext cx="2161079" cy="369332"/>
+          </a:xfrm>
+          <a:prstGeom prst="rect">
+            <a:avLst/>
+          </a:prstGeom>
+          <a:noFill/>
+        </p:spPr>
+        <p:txBody>
+          <a:bodyPr wrap="square" rtlCol="0">
+            <a:spAutoFit/>
+          </a:bodyPr>
+          <a:lstStyle/>
+          <a:p>
+            <a:r>
+              <a:rPr lang="en-US" b="1" dirty="0" smtClean="0"/>
+              <a:t>Covariance</a:t>
+            </a:r>
+            <a:endParaRPr lang="ru-RU" b="1" dirty="0"/>
+          </a:p>
+        </p:txBody>
+      </p:sp>
+      <p:pic>
+        <p:nvPicPr>
+          <p:cNvPr id="8" name="Рисунок 7"/>
+          <p:cNvPicPr>
+            <a:picLocks noChangeAspect="1"/>
+          </p:cNvPicPr>
+          <p:nvPr/>
+        </p:nvPicPr>
+        <p:blipFill>
+          <a:blip r:embed="rId2"/>
+          <a:stretch>
+            <a:fillRect/>
+          </a:stretch>
+        </p:blipFill>
+        <p:spPr>
+          <a:xfrm>
+            <a:off x="473960" y="1292785"/>
+            <a:ext cx="6921949" cy="1368934"/>
+          </a:xfrm>
+          <a:prstGeom prst="rect">
+            <a:avLst/>
+          </a:prstGeom>
+        </p:spPr>
+      </p:pic>
+      <p:pic>
+        <p:nvPicPr>
+          <p:cNvPr id="9" name="Рисунок 8"/>
+          <p:cNvPicPr>
+            <a:picLocks noChangeAspect="1"/>
+          </p:cNvPicPr>
+          <p:nvPr/>
+        </p:nvPicPr>
+        <p:blipFill>
+          <a:blip r:embed="rId3"/>
+          <a:stretch>
+            <a:fillRect/>
+          </a:stretch>
+        </p:blipFill>
+        <p:spPr>
+          <a:xfrm>
+            <a:off x="473960" y="3414350"/>
+            <a:ext cx="6921949" cy="2031322"/>
+          </a:xfrm>
+          <a:prstGeom prst="rect">
+            <a:avLst/>
+          </a:prstGeom>
+        </p:spPr>
+      </p:pic>
+      <p:sp>
+        <p:nvSpPr>
+          <p:cNvPr id="10" name="TextBox 9"/>
+          <p:cNvSpPr txBox="1"/>
+          <p:nvPr/>
+        </p:nvSpPr>
+        <p:spPr>
+          <a:xfrm>
+            <a:off x="381918" y="3031051"/>
+            <a:ext cx="2161079" cy="369332"/>
+          </a:xfrm>
+          <a:prstGeom prst="rect">
+            <a:avLst/>
+          </a:prstGeom>
+          <a:noFill/>
+        </p:spPr>
+        <p:txBody>
+          <a:bodyPr wrap="square" rtlCol="0">
+            <a:spAutoFit/>
+          </a:bodyPr>
+          <a:lstStyle/>
+          <a:p>
+            <a:r>
+              <a:rPr lang="en-US" b="1" dirty="0" smtClean="0"/>
+              <a:t>Correlation</a:t>
+            </a:r>
+            <a:endParaRPr lang="ru-RU" b="1" dirty="0"/>
+          </a:p>
+        </p:txBody>
+      </p:sp>
+    </p:spTree>
+    <p:extLst>
+      <p:ext uri="{BB962C8B-B14F-4D97-AF65-F5344CB8AC3E}">
+        <p14:creationId xmlns:p14="http://schemas.microsoft.com/office/powerpoint/2010/main" val="1230422739"/>
       </p:ext>
     </p:extLst>
   </p:cSld>

</xml_diff>

<commit_message>
Applied example and draft R file is added.
</commit_message>
<xml_diff>
--- a/Exploratory_Analysis.pptx
+++ b/Exploratory_Analysis.pptx
@@ -5,7 +5,7 @@
     <p:sldMasterId id="2147483660" r:id="rId1"/>
   </p:sldMasterIdLst>
   <p:notesMasterIdLst>
-    <p:notesMasterId r:id="rId18"/>
+    <p:notesMasterId r:id="rId20"/>
   </p:notesMasterIdLst>
   <p:sldIdLst>
     <p:sldId id="257" r:id="rId2"/>
@@ -24,6 +24,8 @@
     <p:sldId id="269" r:id="rId15"/>
     <p:sldId id="270" r:id="rId16"/>
     <p:sldId id="271" r:id="rId17"/>
+    <p:sldId id="272" r:id="rId18"/>
+    <p:sldId id="273" r:id="rId19"/>
   </p:sldIdLst>
   <p:sldSz cx="9144000" cy="6858000" type="screen4x3"/>
   <p:notesSz cx="6858000" cy="9144000"/>
@@ -238,7 +240,7 @@
           <a:p>
             <a:fld id="{CD863C69-6AC4-4515-84BB-C614EE551B82}" type="datetimeFigureOut">
               <a:rPr lang="ru-RU" smtClean="0"/>
-              <a:t>06.06.2019</a:t>
+              <a:t>09.06.2019</a:t>
             </a:fld>
             <a:endParaRPr lang="ru-RU"/>
           </a:p>
@@ -637,7 +639,7 @@
           <a:p>
             <a:fld id="{BF38C05E-219E-4729-9909-5B693F1E4DB2}" type="datetime1">
               <a:rPr lang="ru-RU" smtClean="0"/>
-              <a:t>06.06.2019</a:t>
+              <a:t>09.06.2019</a:t>
             </a:fld>
             <a:endParaRPr lang="ru-RU"/>
           </a:p>
@@ -807,7 +809,7 @@
           <a:p>
             <a:fld id="{E587BD1D-74D3-449F-A3CA-F47BBACDADC1}" type="datetime1">
               <a:rPr lang="ru-RU" smtClean="0"/>
-              <a:t>06.06.2019</a:t>
+              <a:t>09.06.2019</a:t>
             </a:fld>
             <a:endParaRPr lang="ru-RU"/>
           </a:p>
@@ -987,7 +989,7 @@
           <a:p>
             <a:fld id="{F156E365-3C59-403F-A598-8903968D44C1}" type="datetime1">
               <a:rPr lang="ru-RU" smtClean="0"/>
-              <a:t>06.06.2019</a:t>
+              <a:t>09.06.2019</a:t>
             </a:fld>
             <a:endParaRPr lang="ru-RU"/>
           </a:p>
@@ -1157,7 +1159,7 @@
           <a:p>
             <a:fld id="{D71D973D-7295-497C-A5AE-B81A0C1EA542}" type="datetime1">
               <a:rPr lang="ru-RU" smtClean="0"/>
-              <a:t>06.06.2019</a:t>
+              <a:t>09.06.2019</a:t>
             </a:fld>
             <a:endParaRPr lang="ru-RU"/>
           </a:p>
@@ -1401,7 +1403,7 @@
           <a:p>
             <a:fld id="{D43ACA65-1DF0-4542-9513-2573006F2B09}" type="datetime1">
               <a:rPr lang="ru-RU" smtClean="0"/>
-              <a:t>06.06.2019</a:t>
+              <a:t>09.06.2019</a:t>
             </a:fld>
             <a:endParaRPr lang="ru-RU"/>
           </a:p>
@@ -1633,7 +1635,7 @@
           <a:p>
             <a:fld id="{CE5D4F0D-BE92-42E2-AC19-D4AE919B8EEA}" type="datetime1">
               <a:rPr lang="ru-RU" smtClean="0"/>
-              <a:t>06.06.2019</a:t>
+              <a:t>09.06.2019</a:t>
             </a:fld>
             <a:endParaRPr lang="ru-RU"/>
           </a:p>
@@ -2000,7 +2002,7 @@
           <a:p>
             <a:fld id="{31712A4F-404C-4E2A-B048-29FEE1F56BCC}" type="datetime1">
               <a:rPr lang="ru-RU" smtClean="0"/>
-              <a:t>06.06.2019</a:t>
+              <a:t>09.06.2019</a:t>
             </a:fld>
             <a:endParaRPr lang="ru-RU"/>
           </a:p>
@@ -2118,7 +2120,7 @@
           <a:p>
             <a:fld id="{A591E32F-21C9-4A73-9D8C-CB8422C8AD99}" type="datetime1">
               <a:rPr lang="ru-RU" smtClean="0"/>
-              <a:t>06.06.2019</a:t>
+              <a:t>09.06.2019</a:t>
             </a:fld>
             <a:endParaRPr lang="ru-RU"/>
           </a:p>
@@ -2213,7 +2215,7 @@
           <a:p>
             <a:fld id="{E8BE7035-4758-4463-AF71-B436150BF40F}" type="datetime1">
               <a:rPr lang="ru-RU" smtClean="0"/>
-              <a:t>06.06.2019</a:t>
+              <a:t>09.06.2019</a:t>
             </a:fld>
             <a:endParaRPr lang="ru-RU"/>
           </a:p>
@@ -2490,7 +2492,7 @@
           <a:p>
             <a:fld id="{8BF22BB4-229E-48DC-A891-0BD3792CC568}" type="datetime1">
               <a:rPr lang="ru-RU" smtClean="0"/>
-              <a:t>06.06.2019</a:t>
+              <a:t>09.06.2019</a:t>
             </a:fld>
             <a:endParaRPr lang="ru-RU"/>
           </a:p>
@@ -2747,7 +2749,7 @@
           <a:p>
             <a:fld id="{B32F65DE-1A63-4DFF-816D-2C4DB2F0AABF}" type="datetime1">
               <a:rPr lang="ru-RU" smtClean="0"/>
-              <a:t>06.06.2019</a:t>
+              <a:t>09.06.2019</a:t>
             </a:fld>
             <a:endParaRPr lang="ru-RU"/>
           </a:p>
@@ -2960,7 +2962,7 @@
           <a:p>
             <a:fld id="{58F37F58-E97F-4EAB-9CA9-C9A7312871A5}" type="datetime1">
               <a:rPr lang="ru-RU" smtClean="0"/>
-              <a:t>06.06.2019</a:t>
+              <a:t>09.06.2019</a:t>
             </a:fld>
             <a:endParaRPr lang="ru-RU"/>
           </a:p>
@@ -5296,6 +5298,328 @@
     <p:extLst>
       <p:ext uri="{BB962C8B-B14F-4D97-AF65-F5344CB8AC3E}">
         <p14:creationId xmlns:p14="http://schemas.microsoft.com/office/powerpoint/2010/main" val="1230422739"/>
+      </p:ext>
+    </p:extLst>
+  </p:cSld>
+  <p:clrMapOvr>
+    <a:masterClrMapping/>
+  </p:clrMapOvr>
+</p:sld>
+</file>
+
+<file path=ppt/slides/slide17.xml><?xml version="1.0" encoding="utf-8"?>
+<p:sld xmlns:a="http://schemas.openxmlformats.org/drawingml/2006/main" xmlns:r="http://schemas.openxmlformats.org/officeDocument/2006/relationships" xmlns:p="http://schemas.openxmlformats.org/presentationml/2006/main">
+  <p:cSld>
+    <p:spTree>
+      <p:nvGrpSpPr>
+        <p:cNvPr id="1" name=""/>
+        <p:cNvGrpSpPr/>
+        <p:nvPr/>
+      </p:nvGrpSpPr>
+      <p:grpSpPr>
+        <a:xfrm>
+          <a:off x="0" y="0"/>
+          <a:ext cx="0" cy="0"/>
+          <a:chOff x="0" y="0"/>
+          <a:chExt cx="0" cy="0"/>
+        </a:xfrm>
+      </p:grpSpPr>
+      <p:sp>
+        <p:nvSpPr>
+          <p:cNvPr id="4" name="Номер слайда 3"/>
+          <p:cNvSpPr>
+            <a:spLocks noGrp="1"/>
+          </p:cNvSpPr>
+          <p:nvPr>
+            <p:ph type="sldNum" sz="quarter" idx="12"/>
+          </p:nvPr>
+        </p:nvSpPr>
+        <p:spPr/>
+        <p:txBody>
+          <a:bodyPr/>
+          <a:lstStyle/>
+          <a:p>
+            <a:fld id="{C936BD1D-689F-4FB2-8C94-2D2423F07E62}" type="slidenum">
+              <a:rPr lang="ru-RU" smtClean="0"/>
+              <a:t>17</a:t>
+            </a:fld>
+            <a:endParaRPr lang="ru-RU"/>
+          </a:p>
+        </p:txBody>
+      </p:sp>
+      <p:sp>
+        <p:nvSpPr>
+          <p:cNvPr id="7" name="Заголовок 1"/>
+          <p:cNvSpPr>
+            <a:spLocks noGrp="1"/>
+          </p:cNvSpPr>
+          <p:nvPr>
+            <p:ph type="title"/>
+          </p:nvPr>
+        </p:nvSpPr>
+        <p:spPr>
+          <a:xfrm>
+            <a:off x="628650" y="365127"/>
+            <a:ext cx="7886700" cy="476846"/>
+          </a:xfrm>
+        </p:spPr>
+        <p:txBody>
+          <a:bodyPr vert="horz" lIns="91440" tIns="45720" rIns="91440" bIns="45720" rtlCol="0" anchor="b">
+            <a:noAutofit/>
+          </a:bodyPr>
+          <a:lstStyle/>
+          <a:p>
+            <a:pPr algn="ctr"/>
+            <a:r>
+              <a:rPr lang="en-US" sz="2400" b="1" dirty="0" smtClean="0">
+                <a:solidFill>
+                  <a:srgbClr val="00B0F0"/>
+                </a:solidFill>
+              </a:rPr>
+              <a:t>Applied example</a:t>
+            </a:r>
+            <a:endParaRPr lang="ru-RU" sz="2400" b="1" dirty="0">
+              <a:solidFill>
+                <a:srgbClr val="00B0F0"/>
+              </a:solidFill>
+            </a:endParaRPr>
+          </a:p>
+        </p:txBody>
+      </p:sp>
+      <p:pic>
+        <p:nvPicPr>
+          <p:cNvPr id="9" name="Рисунок 8"/>
+          <p:cNvPicPr>
+            <a:picLocks noChangeAspect="1"/>
+          </p:cNvPicPr>
+          <p:nvPr/>
+        </p:nvPicPr>
+        <p:blipFill>
+          <a:blip r:embed="rId2"/>
+          <a:stretch>
+            <a:fillRect/>
+          </a:stretch>
+        </p:blipFill>
+        <p:spPr>
+          <a:xfrm>
+            <a:off x="1255500" y="1132931"/>
+            <a:ext cx="6633000" cy="4230000"/>
+          </a:xfrm>
+          <a:prstGeom prst="rect">
+            <a:avLst/>
+          </a:prstGeom>
+        </p:spPr>
+      </p:pic>
+    </p:spTree>
+    <p:extLst>
+      <p:ext uri="{BB962C8B-B14F-4D97-AF65-F5344CB8AC3E}">
+        <p14:creationId xmlns:p14="http://schemas.microsoft.com/office/powerpoint/2010/main" val="2246501106"/>
+      </p:ext>
+    </p:extLst>
+  </p:cSld>
+  <p:clrMapOvr>
+    <a:masterClrMapping/>
+  </p:clrMapOvr>
+</p:sld>
+</file>
+
+<file path=ppt/slides/slide18.xml><?xml version="1.0" encoding="utf-8"?>
+<p:sld xmlns:a="http://schemas.openxmlformats.org/drawingml/2006/main" xmlns:r="http://schemas.openxmlformats.org/officeDocument/2006/relationships" xmlns:p="http://schemas.openxmlformats.org/presentationml/2006/main">
+  <p:cSld>
+    <p:spTree>
+      <p:nvGrpSpPr>
+        <p:cNvPr id="1" name=""/>
+        <p:cNvGrpSpPr/>
+        <p:nvPr/>
+      </p:nvGrpSpPr>
+      <p:grpSpPr>
+        <a:xfrm>
+          <a:off x="0" y="0"/>
+          <a:ext cx="0" cy="0"/>
+          <a:chOff x="0" y="0"/>
+          <a:chExt cx="0" cy="0"/>
+        </a:xfrm>
+      </p:grpSpPr>
+      <p:sp>
+        <p:nvSpPr>
+          <p:cNvPr id="4" name="Номер слайда 3"/>
+          <p:cNvSpPr>
+            <a:spLocks noGrp="1"/>
+          </p:cNvSpPr>
+          <p:nvPr>
+            <p:ph type="sldNum" sz="quarter" idx="12"/>
+          </p:nvPr>
+        </p:nvSpPr>
+        <p:spPr/>
+        <p:txBody>
+          <a:bodyPr/>
+          <a:lstStyle/>
+          <a:p>
+            <a:fld id="{C936BD1D-689F-4FB2-8C94-2D2423F07E62}" type="slidenum">
+              <a:rPr lang="ru-RU" smtClean="0"/>
+              <a:t>18</a:t>
+            </a:fld>
+            <a:endParaRPr lang="ru-RU"/>
+          </a:p>
+        </p:txBody>
+      </p:sp>
+      <p:sp>
+        <p:nvSpPr>
+          <p:cNvPr id="6" name="Заголовок 1"/>
+          <p:cNvSpPr>
+            <a:spLocks noGrp="1"/>
+          </p:cNvSpPr>
+          <p:nvPr>
+            <p:ph type="title"/>
+          </p:nvPr>
+        </p:nvSpPr>
+        <p:spPr>
+          <a:xfrm>
+            <a:off x="628650" y="365127"/>
+            <a:ext cx="7886700" cy="476846"/>
+          </a:xfrm>
+        </p:spPr>
+        <p:txBody>
+          <a:bodyPr vert="horz" lIns="91440" tIns="45720" rIns="91440" bIns="45720" rtlCol="0" anchor="b">
+            <a:noAutofit/>
+          </a:bodyPr>
+          <a:lstStyle/>
+          <a:p>
+            <a:pPr algn="ctr"/>
+            <a:r>
+              <a:rPr lang="en-US" sz="2400" b="1" dirty="0" smtClean="0">
+                <a:solidFill>
+                  <a:srgbClr val="00B0F0"/>
+                </a:solidFill>
+              </a:rPr>
+              <a:t>Brief Summary of Applied Example</a:t>
+            </a:r>
+            <a:endParaRPr lang="ru-RU" sz="2400" b="1" dirty="0">
+              <a:solidFill>
+                <a:srgbClr val="00B0F0"/>
+              </a:solidFill>
+            </a:endParaRPr>
+          </a:p>
+        </p:txBody>
+      </p:sp>
+      <p:sp>
+        <p:nvSpPr>
+          <p:cNvPr id="8" name="TextBox 7"/>
+          <p:cNvSpPr txBox="1"/>
+          <p:nvPr/>
+        </p:nvSpPr>
+        <p:spPr>
+          <a:xfrm>
+            <a:off x="208230" y="1176950"/>
+            <a:ext cx="8709433" cy="3416320"/>
+          </a:xfrm>
+          <a:prstGeom prst="rect">
+            <a:avLst/>
+          </a:prstGeom>
+          <a:noFill/>
+        </p:spPr>
+        <p:txBody>
+          <a:bodyPr wrap="square" rtlCol="0">
+            <a:spAutoFit/>
+          </a:bodyPr>
+          <a:lstStyle/>
+          <a:p>
+            <a:pPr marL="285750" indent="-285750">
+              <a:buFont typeface="Arial" panose="020B0604020202020204" pitchFamily="34" charset="0"/>
+              <a:buChar char="•"/>
+            </a:pPr>
+            <a:r>
+              <a:rPr lang="en-US" dirty="0"/>
+              <a:t>a</a:t>
+            </a:r>
+            <a:r>
+              <a:rPr lang="en-US" dirty="0" smtClean="0"/>
+              <a:t>ll variables contain extreme values which could be investigated</a:t>
+            </a:r>
+          </a:p>
+          <a:p>
+            <a:pPr marL="285750" indent="-285750">
+              <a:buFont typeface="Arial" panose="020B0604020202020204" pitchFamily="34" charset="0"/>
+              <a:buChar char="•"/>
+            </a:pPr>
+            <a:endParaRPr lang="en-US" dirty="0" smtClean="0"/>
+          </a:p>
+          <a:p>
+            <a:pPr marL="285750" indent="-285750">
+              <a:buFont typeface="Arial" panose="020B0604020202020204" pitchFamily="34" charset="0"/>
+              <a:buChar char="•"/>
+            </a:pPr>
+            <a:r>
+              <a:rPr lang="en-US" dirty="0" smtClean="0"/>
+              <a:t>from the point of view of variance the best </a:t>
+            </a:r>
+            <a:r>
+              <a:rPr lang="en-US" dirty="0"/>
+              <a:t>variable is </a:t>
+            </a:r>
+            <a:r>
+              <a:rPr lang="en-US" dirty="0" smtClean="0"/>
+              <a:t>HOUR_APPR_PROCESS_START (27%) -&gt; it could be used in further draft calculations even despite high oscillator ratio</a:t>
+            </a:r>
+          </a:p>
+          <a:p>
+            <a:r>
+              <a:rPr lang="en-US" dirty="0"/>
+              <a:t> </a:t>
+            </a:r>
+            <a:endParaRPr lang="en-US" dirty="0" smtClean="0"/>
+          </a:p>
+          <a:p>
+            <a:pPr marL="285750" indent="-285750">
+              <a:buFont typeface="Arial" panose="020B0604020202020204" pitchFamily="34" charset="0"/>
+              <a:buChar char="•"/>
+            </a:pPr>
+            <a:r>
+              <a:rPr lang="en-US" dirty="0" smtClean="0"/>
+              <a:t>other variables with high oscillator ratio and variance ratio are subject to be investigated for potential subsampling or aggregation  </a:t>
+            </a:r>
+          </a:p>
+          <a:p>
+            <a:pPr marL="285750" indent="-285750">
+              <a:buFont typeface="Arial" panose="020B0604020202020204" pitchFamily="34" charset="0"/>
+              <a:buChar char="•"/>
+            </a:pPr>
+            <a:endParaRPr lang="en-US" dirty="0"/>
+          </a:p>
+          <a:p>
+            <a:pPr marL="285750" indent="-285750">
+              <a:buFont typeface="Arial" panose="020B0604020202020204" pitchFamily="34" charset="0"/>
+              <a:buChar char="•"/>
+            </a:pPr>
+            <a:r>
+              <a:rPr lang="en-US" dirty="0"/>
+              <a:t>t</a:t>
+            </a:r>
+            <a:r>
+              <a:rPr lang="en-US" dirty="0" smtClean="0"/>
+              <a:t>he existence of more then 1 mode could be the reason to reconsider the data set of the variable. </a:t>
+            </a:r>
+          </a:p>
+          <a:p>
+            <a:pPr marL="285750" indent="-285750">
+              <a:buFont typeface="Arial" panose="020B0604020202020204" pitchFamily="34" charset="0"/>
+              <a:buChar char="•"/>
+            </a:pPr>
+            <a:endParaRPr lang="en-US" dirty="0" smtClean="0"/>
+          </a:p>
+          <a:p>
+            <a:pPr marL="285750" indent="-285750">
+              <a:buFont typeface="Arial" panose="020B0604020202020204" pitchFamily="34" charset="0"/>
+              <a:buChar char="•"/>
+            </a:pPr>
+            <a:endParaRPr lang="ru-RU" dirty="0"/>
+          </a:p>
+        </p:txBody>
+      </p:sp>
+    </p:spTree>
+    <p:extLst>
+      <p:ext uri="{BB962C8B-B14F-4D97-AF65-F5344CB8AC3E}">
+        <p14:creationId xmlns:p14="http://schemas.microsoft.com/office/powerpoint/2010/main" val="4004065868"/>
       </p:ext>
     </p:extLst>
   </p:cSld>

</xml_diff>

<commit_message>
R file compiled. Rnotebook file is in progress.
</commit_message>
<xml_diff>
--- a/Exploratory_Analysis.pptx
+++ b/Exploratory_Analysis.pptx
@@ -240,7 +240,7 @@
           <a:p>
             <a:fld id="{CD863C69-6AC4-4515-84BB-C614EE551B82}" type="datetimeFigureOut">
               <a:rPr lang="ru-RU" smtClean="0"/>
-              <a:t>09.06.2019</a:t>
+              <a:t>12.06.2019</a:t>
             </a:fld>
             <a:endParaRPr lang="ru-RU"/>
           </a:p>
@@ -639,7 +639,7 @@
           <a:p>
             <a:fld id="{BF38C05E-219E-4729-9909-5B693F1E4DB2}" type="datetime1">
               <a:rPr lang="ru-RU" smtClean="0"/>
-              <a:t>09.06.2019</a:t>
+              <a:t>12.06.2019</a:t>
             </a:fld>
             <a:endParaRPr lang="ru-RU"/>
           </a:p>
@@ -809,7 +809,7 @@
           <a:p>
             <a:fld id="{E587BD1D-74D3-449F-A3CA-F47BBACDADC1}" type="datetime1">
               <a:rPr lang="ru-RU" smtClean="0"/>
-              <a:t>09.06.2019</a:t>
+              <a:t>12.06.2019</a:t>
             </a:fld>
             <a:endParaRPr lang="ru-RU"/>
           </a:p>
@@ -989,7 +989,7 @@
           <a:p>
             <a:fld id="{F156E365-3C59-403F-A598-8903968D44C1}" type="datetime1">
               <a:rPr lang="ru-RU" smtClean="0"/>
-              <a:t>09.06.2019</a:t>
+              <a:t>12.06.2019</a:t>
             </a:fld>
             <a:endParaRPr lang="ru-RU"/>
           </a:p>
@@ -1159,7 +1159,7 @@
           <a:p>
             <a:fld id="{D71D973D-7295-497C-A5AE-B81A0C1EA542}" type="datetime1">
               <a:rPr lang="ru-RU" smtClean="0"/>
-              <a:t>09.06.2019</a:t>
+              <a:t>12.06.2019</a:t>
             </a:fld>
             <a:endParaRPr lang="ru-RU"/>
           </a:p>
@@ -1403,7 +1403,7 @@
           <a:p>
             <a:fld id="{D43ACA65-1DF0-4542-9513-2573006F2B09}" type="datetime1">
               <a:rPr lang="ru-RU" smtClean="0"/>
-              <a:t>09.06.2019</a:t>
+              <a:t>12.06.2019</a:t>
             </a:fld>
             <a:endParaRPr lang="ru-RU"/>
           </a:p>
@@ -1635,7 +1635,7 @@
           <a:p>
             <a:fld id="{CE5D4F0D-BE92-42E2-AC19-D4AE919B8EEA}" type="datetime1">
               <a:rPr lang="ru-RU" smtClean="0"/>
-              <a:t>09.06.2019</a:t>
+              <a:t>12.06.2019</a:t>
             </a:fld>
             <a:endParaRPr lang="ru-RU"/>
           </a:p>
@@ -2002,7 +2002,7 @@
           <a:p>
             <a:fld id="{31712A4F-404C-4E2A-B048-29FEE1F56BCC}" type="datetime1">
               <a:rPr lang="ru-RU" smtClean="0"/>
-              <a:t>09.06.2019</a:t>
+              <a:t>12.06.2019</a:t>
             </a:fld>
             <a:endParaRPr lang="ru-RU"/>
           </a:p>
@@ -2120,7 +2120,7 @@
           <a:p>
             <a:fld id="{A591E32F-21C9-4A73-9D8C-CB8422C8AD99}" type="datetime1">
               <a:rPr lang="ru-RU" smtClean="0"/>
-              <a:t>09.06.2019</a:t>
+              <a:t>12.06.2019</a:t>
             </a:fld>
             <a:endParaRPr lang="ru-RU"/>
           </a:p>
@@ -2215,7 +2215,7 @@
           <a:p>
             <a:fld id="{E8BE7035-4758-4463-AF71-B436150BF40F}" type="datetime1">
               <a:rPr lang="ru-RU" smtClean="0"/>
-              <a:t>09.06.2019</a:t>
+              <a:t>12.06.2019</a:t>
             </a:fld>
             <a:endParaRPr lang="ru-RU"/>
           </a:p>
@@ -2492,7 +2492,7 @@
           <a:p>
             <a:fld id="{8BF22BB4-229E-48DC-A891-0BD3792CC568}" type="datetime1">
               <a:rPr lang="ru-RU" smtClean="0"/>
-              <a:t>09.06.2019</a:t>
+              <a:t>12.06.2019</a:t>
             </a:fld>
             <a:endParaRPr lang="ru-RU"/>
           </a:p>
@@ -2749,7 +2749,7 @@
           <a:p>
             <a:fld id="{B32F65DE-1A63-4DFF-816D-2C4DB2F0AABF}" type="datetime1">
               <a:rPr lang="ru-RU" smtClean="0"/>
-              <a:t>09.06.2019</a:t>
+              <a:t>12.06.2019</a:t>
             </a:fld>
             <a:endParaRPr lang="ru-RU"/>
           </a:p>
@@ -2962,7 +2962,7 @@
           <a:p>
             <a:fld id="{58F37F58-E97F-4EAB-9CA9-C9A7312871A5}" type="datetime1">
               <a:rPr lang="ru-RU" smtClean="0"/>
-              <a:t>09.06.2019</a:t>
+              <a:t>12.06.2019</a:t>
             </a:fld>
             <a:endParaRPr lang="ru-RU"/>
           </a:p>
@@ -4328,7 +4328,7 @@
       </p:sp>
       <p:pic>
         <p:nvPicPr>
-          <p:cNvPr id="7" name="Рисунок 6"/>
+          <p:cNvPr id="3" name="Рисунок 2"/>
           <p:cNvPicPr>
             <a:picLocks noChangeAspect="1"/>
           </p:cNvPicPr>
@@ -4342,8 +4342,8 @@
         </p:blipFill>
         <p:spPr>
           <a:xfrm>
-            <a:off x="1072742" y="1146706"/>
-            <a:ext cx="6441752" cy="3687843"/>
+            <a:off x="1255500" y="1314000"/>
+            <a:ext cx="6633000" cy="4230000"/>
           </a:xfrm>
           <a:prstGeom prst="rect">
             <a:avLst/>
@@ -5388,7 +5388,7 @@
       </p:sp>
       <p:pic>
         <p:nvPicPr>
-          <p:cNvPr id="9" name="Рисунок 8"/>
+          <p:cNvPr id="2" name="Рисунок 1"/>
           <p:cNvPicPr>
             <a:picLocks noChangeAspect="1"/>
           </p:cNvPicPr>
@@ -5402,7 +5402,7 @@
         </p:blipFill>
         <p:spPr>
           <a:xfrm>
-            <a:off x="1255500" y="1132931"/>
+            <a:off x="1255500" y="997128"/>
             <a:ext cx="6633000" cy="4230000"/>
           </a:xfrm>
           <a:prstGeom prst="rect">

</xml_diff>